<commit_message>
complete - Composite Castellated Beam Design Calculator
</commit_message>
<xml_diff>
--- a/assets/powerpoint/castellated.pptx
+++ b/assets/powerpoint/castellated.pptx
@@ -6,6 +6,7 @@
   </p:sldMasterIdLst>
   <p:sldIdLst>
     <p:sldId id="256" r:id="rId2"/>
+    <p:sldId id="257" r:id="rId3"/>
   </p:sldIdLst>
   <p:sldSz cx="12192000" cy="6858000"/>
   <p:notesSz cx="6858000" cy="9144000"/>
@@ -243,7 +244,7 @@
           <a:p>
             <a:fld id="{CF767ECB-A598-4D66-9B44-35AD824C9C45}" type="datetimeFigureOut">
               <a:rPr lang="ko-KR" altLang="en-US" smtClean="0"/>
-              <a:t>2026-01-28</a:t>
+              <a:t>2026-01-29</a:t>
             </a:fld>
             <a:endParaRPr lang="ko-KR" altLang="en-US"/>
           </a:p>
@@ -413,7 +414,7 @@
           <a:p>
             <a:fld id="{CF767ECB-A598-4D66-9B44-35AD824C9C45}" type="datetimeFigureOut">
               <a:rPr lang="ko-KR" altLang="en-US" smtClean="0"/>
-              <a:t>2026-01-28</a:t>
+              <a:t>2026-01-29</a:t>
             </a:fld>
             <a:endParaRPr lang="ko-KR" altLang="en-US"/>
           </a:p>
@@ -593,7 +594,7 @@
           <a:p>
             <a:fld id="{CF767ECB-A598-4D66-9B44-35AD824C9C45}" type="datetimeFigureOut">
               <a:rPr lang="ko-KR" altLang="en-US" smtClean="0"/>
-              <a:t>2026-01-28</a:t>
+              <a:t>2026-01-29</a:t>
             </a:fld>
             <a:endParaRPr lang="ko-KR" altLang="en-US"/>
           </a:p>
@@ -763,7 +764,7 @@
           <a:p>
             <a:fld id="{CF767ECB-A598-4D66-9B44-35AD824C9C45}" type="datetimeFigureOut">
               <a:rPr lang="ko-KR" altLang="en-US" smtClean="0"/>
-              <a:t>2026-01-28</a:t>
+              <a:t>2026-01-29</a:t>
             </a:fld>
             <a:endParaRPr lang="ko-KR" altLang="en-US"/>
           </a:p>
@@ -1009,7 +1010,7 @@
           <a:p>
             <a:fld id="{CF767ECB-A598-4D66-9B44-35AD824C9C45}" type="datetimeFigureOut">
               <a:rPr lang="ko-KR" altLang="en-US" smtClean="0"/>
-              <a:t>2026-01-28</a:t>
+              <a:t>2026-01-29</a:t>
             </a:fld>
             <a:endParaRPr lang="ko-KR" altLang="en-US"/>
           </a:p>
@@ -1241,7 +1242,7 @@
           <a:p>
             <a:fld id="{CF767ECB-A598-4D66-9B44-35AD824C9C45}" type="datetimeFigureOut">
               <a:rPr lang="ko-KR" altLang="en-US" smtClean="0"/>
-              <a:t>2026-01-28</a:t>
+              <a:t>2026-01-29</a:t>
             </a:fld>
             <a:endParaRPr lang="ko-KR" altLang="en-US"/>
           </a:p>
@@ -1608,7 +1609,7 @@
           <a:p>
             <a:fld id="{CF767ECB-A598-4D66-9B44-35AD824C9C45}" type="datetimeFigureOut">
               <a:rPr lang="ko-KR" altLang="en-US" smtClean="0"/>
-              <a:t>2026-01-28</a:t>
+              <a:t>2026-01-29</a:t>
             </a:fld>
             <a:endParaRPr lang="ko-KR" altLang="en-US"/>
           </a:p>
@@ -1726,7 +1727,7 @@
           <a:p>
             <a:fld id="{CF767ECB-A598-4D66-9B44-35AD824C9C45}" type="datetimeFigureOut">
               <a:rPr lang="ko-KR" altLang="en-US" smtClean="0"/>
-              <a:t>2026-01-28</a:t>
+              <a:t>2026-01-29</a:t>
             </a:fld>
             <a:endParaRPr lang="ko-KR" altLang="en-US"/>
           </a:p>
@@ -1821,7 +1822,7 @@
           <a:p>
             <a:fld id="{CF767ECB-A598-4D66-9B44-35AD824C9C45}" type="datetimeFigureOut">
               <a:rPr lang="ko-KR" altLang="en-US" smtClean="0"/>
-              <a:t>2026-01-28</a:t>
+              <a:t>2026-01-29</a:t>
             </a:fld>
             <a:endParaRPr lang="ko-KR" altLang="en-US"/>
           </a:p>
@@ -2098,7 +2099,7 @@
           <a:p>
             <a:fld id="{CF767ECB-A598-4D66-9B44-35AD824C9C45}" type="datetimeFigureOut">
               <a:rPr lang="ko-KR" altLang="en-US" smtClean="0"/>
-              <a:t>2026-01-28</a:t>
+              <a:t>2026-01-29</a:t>
             </a:fld>
             <a:endParaRPr lang="ko-KR" altLang="en-US"/>
           </a:p>
@@ -2351,7 +2352,7 @@
           <a:p>
             <a:fld id="{CF767ECB-A598-4D66-9B44-35AD824C9C45}" type="datetimeFigureOut">
               <a:rPr lang="ko-KR" altLang="en-US" smtClean="0"/>
-              <a:t>2026-01-28</a:t>
+              <a:t>2026-01-29</a:t>
             </a:fld>
             <a:endParaRPr lang="ko-KR" altLang="en-US"/>
           </a:p>
@@ -2564,7 +2565,7 @@
           <a:p>
             <a:fld id="{CF767ECB-A598-4D66-9B44-35AD824C9C45}" type="datetimeFigureOut">
               <a:rPr lang="ko-KR" altLang="en-US" smtClean="0"/>
-              <a:t>2026-01-28</a:t>
+              <a:t>2026-01-29</a:t>
             </a:fld>
             <a:endParaRPr lang="ko-KR" altLang="en-US"/>
           </a:p>
@@ -3008,6 +3009,1635 @@
           </a:p>
         </p:txBody>
       </p:sp>
+      <p:grpSp>
+        <p:nvGrpSpPr>
+          <p:cNvPr id="2" name="그룹 1"/>
+          <p:cNvGrpSpPr/>
+          <p:nvPr/>
+        </p:nvGrpSpPr>
+        <p:grpSpPr>
+          <a:xfrm>
+            <a:off x="201090" y="2357098"/>
+            <a:ext cx="4385425" cy="2243931"/>
+            <a:chOff x="897775" y="1950698"/>
+            <a:chExt cx="7385165" cy="3592279"/>
+          </a:xfrm>
+        </p:grpSpPr>
+        <p:cxnSp>
+          <p:nvCxnSpPr>
+            <p:cNvPr id="15" name="직선 연결선 14"/>
+            <p:cNvCxnSpPr/>
+            <p:nvPr/>
+          </p:nvCxnSpPr>
+          <p:spPr>
+            <a:xfrm>
+              <a:off x="2049612" y="1978429"/>
+              <a:ext cx="6126648" cy="0"/>
+            </a:xfrm>
+            <a:prstGeom prst="line">
+              <a:avLst/>
+            </a:prstGeom>
+            <a:ln w="63500">
+              <a:solidFill>
+                <a:schemeClr val="tx1"/>
+              </a:solidFill>
+            </a:ln>
+          </p:spPr>
+          <p:style>
+            <a:lnRef idx="1">
+              <a:schemeClr val="accent1"/>
+            </a:lnRef>
+            <a:fillRef idx="0">
+              <a:schemeClr val="accent1"/>
+            </a:fillRef>
+            <a:effectRef idx="0">
+              <a:schemeClr val="accent1"/>
+            </a:effectRef>
+            <a:fontRef idx="minor">
+              <a:schemeClr val="tx1"/>
+            </a:fontRef>
+          </p:style>
+        </p:cxnSp>
+        <p:cxnSp>
+          <p:nvCxnSpPr>
+            <p:cNvPr id="18" name="직선 연결선 17"/>
+            <p:cNvCxnSpPr/>
+            <p:nvPr/>
+          </p:nvCxnSpPr>
+          <p:spPr>
+            <a:xfrm>
+              <a:off x="2049612" y="2123614"/>
+              <a:ext cx="6126648" cy="0"/>
+            </a:xfrm>
+            <a:prstGeom prst="line">
+              <a:avLst/>
+            </a:prstGeom>
+            <a:ln w="63500">
+              <a:solidFill>
+                <a:schemeClr val="tx1"/>
+              </a:solidFill>
+            </a:ln>
+          </p:spPr>
+          <p:style>
+            <a:lnRef idx="1">
+              <a:schemeClr val="accent1"/>
+            </a:lnRef>
+            <a:fillRef idx="0">
+              <a:schemeClr val="accent1"/>
+            </a:fillRef>
+            <a:effectRef idx="0">
+              <a:schemeClr val="accent1"/>
+            </a:effectRef>
+            <a:fontRef idx="minor">
+              <a:schemeClr val="tx1"/>
+            </a:fontRef>
+          </p:style>
+        </p:cxnSp>
+        <p:cxnSp>
+          <p:nvCxnSpPr>
+            <p:cNvPr id="19" name="직선 연결선 18"/>
+            <p:cNvCxnSpPr/>
+            <p:nvPr/>
+          </p:nvCxnSpPr>
+          <p:spPr>
+            <a:xfrm>
+              <a:off x="2049612" y="4531129"/>
+              <a:ext cx="6233328" cy="0"/>
+            </a:xfrm>
+            <a:prstGeom prst="line">
+              <a:avLst/>
+            </a:prstGeom>
+            <a:ln w="63500">
+              <a:solidFill>
+                <a:schemeClr val="tx1"/>
+              </a:solidFill>
+            </a:ln>
+          </p:spPr>
+          <p:style>
+            <a:lnRef idx="1">
+              <a:schemeClr val="accent1"/>
+            </a:lnRef>
+            <a:fillRef idx="0">
+              <a:schemeClr val="accent1"/>
+            </a:fillRef>
+            <a:effectRef idx="0">
+              <a:schemeClr val="accent1"/>
+            </a:effectRef>
+            <a:fontRef idx="minor">
+              <a:schemeClr val="tx1"/>
+            </a:fontRef>
+          </p:style>
+        </p:cxnSp>
+        <p:cxnSp>
+          <p:nvCxnSpPr>
+            <p:cNvPr id="20" name="직선 연결선 19"/>
+            <p:cNvCxnSpPr/>
+            <p:nvPr/>
+          </p:nvCxnSpPr>
+          <p:spPr>
+            <a:xfrm>
+              <a:off x="2049612" y="4676314"/>
+              <a:ext cx="6233328" cy="0"/>
+            </a:xfrm>
+            <a:prstGeom prst="line">
+              <a:avLst/>
+            </a:prstGeom>
+            <a:ln w="63500">
+              <a:solidFill>
+                <a:schemeClr val="tx1"/>
+              </a:solidFill>
+            </a:ln>
+          </p:spPr>
+          <p:style>
+            <a:lnRef idx="1">
+              <a:schemeClr val="accent1"/>
+            </a:lnRef>
+            <a:fillRef idx="0">
+              <a:schemeClr val="accent1"/>
+            </a:fillRef>
+            <a:effectRef idx="0">
+              <a:schemeClr val="accent1"/>
+            </a:effectRef>
+            <a:fontRef idx="minor">
+              <a:schemeClr val="tx1"/>
+            </a:fontRef>
+          </p:style>
+        </p:cxnSp>
+        <p:sp>
+          <p:nvSpPr>
+            <p:cNvPr id="21" name="육각형 20"/>
+            <p:cNvSpPr/>
+            <p:nvPr/>
+          </p:nvSpPr>
+          <p:spPr>
+            <a:xfrm>
+              <a:off x="2522220" y="2441567"/>
+              <a:ext cx="1912620" cy="1743730"/>
+            </a:xfrm>
+            <a:prstGeom prst="hexagon">
+              <a:avLst/>
+            </a:prstGeom>
+            <a:noFill/>
+            <a:ln w="50800">
+              <a:solidFill>
+                <a:schemeClr val="tx1"/>
+              </a:solidFill>
+            </a:ln>
+          </p:spPr>
+          <p:style>
+            <a:lnRef idx="2">
+              <a:schemeClr val="accent1">
+                <a:shade val="50000"/>
+              </a:schemeClr>
+            </a:lnRef>
+            <a:fillRef idx="1">
+              <a:schemeClr val="accent1"/>
+            </a:fillRef>
+            <a:effectRef idx="0">
+              <a:schemeClr val="accent1"/>
+            </a:effectRef>
+            <a:fontRef idx="minor">
+              <a:schemeClr val="lt1"/>
+            </a:fontRef>
+          </p:style>
+          <p:txBody>
+            <a:bodyPr rtlCol="0" anchor="ctr"/>
+            <a:lstStyle/>
+            <a:p>
+              <a:pPr algn="ctr"/>
+              <a:endParaRPr lang="ko-KR" altLang="en-US"/>
+            </a:p>
+          </p:txBody>
+        </p:sp>
+        <p:sp>
+          <p:nvSpPr>
+            <p:cNvPr id="22" name="육각형 21"/>
+            <p:cNvSpPr/>
+            <p:nvPr/>
+          </p:nvSpPr>
+          <p:spPr>
+            <a:xfrm>
+              <a:off x="5570220" y="2441567"/>
+              <a:ext cx="1912620" cy="1743730"/>
+            </a:xfrm>
+            <a:prstGeom prst="hexagon">
+              <a:avLst/>
+            </a:prstGeom>
+            <a:noFill/>
+            <a:ln w="50800">
+              <a:solidFill>
+                <a:schemeClr val="tx1"/>
+              </a:solidFill>
+            </a:ln>
+          </p:spPr>
+          <p:style>
+            <a:lnRef idx="2">
+              <a:schemeClr val="accent1">
+                <a:shade val="50000"/>
+              </a:schemeClr>
+            </a:lnRef>
+            <a:fillRef idx="1">
+              <a:schemeClr val="accent1"/>
+            </a:fillRef>
+            <a:effectRef idx="0">
+              <a:schemeClr val="accent1"/>
+            </a:effectRef>
+            <a:fontRef idx="minor">
+              <a:schemeClr val="lt1"/>
+            </a:fontRef>
+          </p:style>
+          <p:txBody>
+            <a:bodyPr rtlCol="0" anchor="ctr"/>
+            <a:lstStyle/>
+            <a:p>
+              <a:pPr algn="ctr"/>
+              <a:endParaRPr lang="ko-KR" altLang="en-US"/>
+            </a:p>
+          </p:txBody>
+        </p:sp>
+        <p:cxnSp>
+          <p:nvCxnSpPr>
+            <p:cNvPr id="24" name="직선 화살표 연결선 23"/>
+            <p:cNvCxnSpPr>
+              <a:stCxn id="21" idx="0"/>
+              <a:endCxn id="22" idx="3"/>
+            </p:cNvCxnSpPr>
+            <p:nvPr/>
+          </p:nvCxnSpPr>
+          <p:spPr>
+            <a:xfrm>
+              <a:off x="4434840" y="3313432"/>
+              <a:ext cx="1135380" cy="0"/>
+            </a:xfrm>
+            <a:prstGeom prst="straightConnector1">
+              <a:avLst/>
+            </a:prstGeom>
+            <a:ln>
+              <a:solidFill>
+                <a:schemeClr val="tx1"/>
+              </a:solidFill>
+              <a:headEnd type="triangle"/>
+              <a:tailEnd type="triangle"/>
+            </a:ln>
+          </p:spPr>
+          <p:style>
+            <a:lnRef idx="1">
+              <a:schemeClr val="accent1"/>
+            </a:lnRef>
+            <a:fillRef idx="0">
+              <a:schemeClr val="accent1"/>
+            </a:fillRef>
+            <a:effectRef idx="0">
+              <a:schemeClr val="accent1"/>
+            </a:effectRef>
+            <a:fontRef idx="minor">
+              <a:schemeClr val="tx1"/>
+            </a:fontRef>
+          </p:style>
+        </p:cxnSp>
+        <p:sp>
+          <p:nvSpPr>
+            <p:cNvPr id="41" name="직사각형 40"/>
+            <p:cNvSpPr/>
+            <p:nvPr/>
+          </p:nvSpPr>
+          <p:spPr>
+            <a:xfrm>
+              <a:off x="4731936" y="2987860"/>
+              <a:ext cx="434340" cy="274320"/>
+            </a:xfrm>
+            <a:prstGeom prst="rect">
+              <a:avLst/>
+            </a:prstGeom>
+            <a:noFill/>
+            <a:ln>
+              <a:noFill/>
+            </a:ln>
+          </p:spPr>
+          <p:style>
+            <a:lnRef idx="2">
+              <a:schemeClr val="accent1">
+                <a:shade val="50000"/>
+              </a:schemeClr>
+            </a:lnRef>
+            <a:fillRef idx="1">
+              <a:schemeClr val="accent1"/>
+            </a:fillRef>
+            <a:effectRef idx="0">
+              <a:schemeClr val="accent1"/>
+            </a:effectRef>
+            <a:fontRef idx="minor">
+              <a:schemeClr val="lt1"/>
+            </a:fontRef>
+          </p:style>
+          <p:txBody>
+            <a:bodyPr rtlCol="0" anchor="ctr"/>
+            <a:lstStyle/>
+            <a:p>
+              <a:pPr algn="ctr"/>
+              <a:r>
+                <a:rPr lang="en-US" altLang="ko-KR" sz="2800" dirty="0" smtClean="0">
+                  <a:solidFill>
+                    <a:schemeClr val="tx1"/>
+                  </a:solidFill>
+                </a:rPr>
+                <a:t>e</a:t>
+              </a:r>
+              <a:endParaRPr lang="ko-KR" altLang="en-US" sz="2800" dirty="0">
+                <a:solidFill>
+                  <a:schemeClr val="tx1"/>
+                </a:solidFill>
+              </a:endParaRPr>
+            </a:p>
+          </p:txBody>
+        </p:sp>
+        <p:cxnSp>
+          <p:nvCxnSpPr>
+            <p:cNvPr id="42" name="직선 화살표 연결선 41"/>
+            <p:cNvCxnSpPr/>
+            <p:nvPr/>
+          </p:nvCxnSpPr>
+          <p:spPr>
+            <a:xfrm>
+              <a:off x="4414736" y="5088892"/>
+              <a:ext cx="3068104" cy="0"/>
+            </a:xfrm>
+            <a:prstGeom prst="straightConnector1">
+              <a:avLst/>
+            </a:prstGeom>
+            <a:ln>
+              <a:solidFill>
+                <a:schemeClr val="tx1"/>
+              </a:solidFill>
+              <a:headEnd type="triangle"/>
+              <a:tailEnd type="triangle"/>
+            </a:ln>
+          </p:spPr>
+          <p:style>
+            <a:lnRef idx="1">
+              <a:schemeClr val="accent1"/>
+            </a:lnRef>
+            <a:fillRef idx="0">
+              <a:schemeClr val="accent1"/>
+            </a:fillRef>
+            <a:effectRef idx="0">
+              <a:schemeClr val="accent1"/>
+            </a:effectRef>
+            <a:fontRef idx="minor">
+              <a:schemeClr val="tx1"/>
+            </a:fontRef>
+          </p:style>
+        </p:cxnSp>
+        <p:cxnSp>
+          <p:nvCxnSpPr>
+            <p:cNvPr id="46" name="직선 연결선 45"/>
+            <p:cNvCxnSpPr>
+              <a:stCxn id="21" idx="0"/>
+            </p:cNvCxnSpPr>
+            <p:nvPr/>
+          </p:nvCxnSpPr>
+          <p:spPr>
+            <a:xfrm>
+              <a:off x="4434840" y="3313432"/>
+              <a:ext cx="0" cy="2229545"/>
+            </a:xfrm>
+            <a:prstGeom prst="line">
+              <a:avLst/>
+            </a:prstGeom>
+            <a:ln>
+              <a:solidFill>
+                <a:schemeClr val="tx1"/>
+              </a:solidFill>
+            </a:ln>
+          </p:spPr>
+          <p:style>
+            <a:lnRef idx="1">
+              <a:schemeClr val="accent1"/>
+            </a:lnRef>
+            <a:fillRef idx="0">
+              <a:schemeClr val="accent1"/>
+            </a:fillRef>
+            <a:effectRef idx="0">
+              <a:schemeClr val="accent1"/>
+            </a:effectRef>
+            <a:fontRef idx="minor">
+              <a:schemeClr val="tx1"/>
+            </a:fontRef>
+          </p:style>
+        </p:cxnSp>
+        <p:cxnSp>
+          <p:nvCxnSpPr>
+            <p:cNvPr id="47" name="직선 연결선 46"/>
+            <p:cNvCxnSpPr/>
+            <p:nvPr/>
+          </p:nvCxnSpPr>
+          <p:spPr>
+            <a:xfrm>
+              <a:off x="7482840" y="3313432"/>
+              <a:ext cx="0" cy="2229545"/>
+            </a:xfrm>
+            <a:prstGeom prst="line">
+              <a:avLst/>
+            </a:prstGeom>
+            <a:ln>
+              <a:solidFill>
+                <a:schemeClr val="tx1"/>
+              </a:solidFill>
+            </a:ln>
+          </p:spPr>
+          <p:style>
+            <a:lnRef idx="1">
+              <a:schemeClr val="accent1"/>
+            </a:lnRef>
+            <a:fillRef idx="0">
+              <a:schemeClr val="accent1"/>
+            </a:fillRef>
+            <a:effectRef idx="0">
+              <a:schemeClr val="accent1"/>
+            </a:effectRef>
+            <a:fontRef idx="minor">
+              <a:schemeClr val="tx1"/>
+            </a:fontRef>
+          </p:style>
+        </p:cxnSp>
+        <p:sp>
+          <p:nvSpPr>
+            <p:cNvPr id="49" name="직사각형 48"/>
+            <p:cNvSpPr/>
+            <p:nvPr/>
+          </p:nvSpPr>
+          <p:spPr>
+            <a:xfrm>
+              <a:off x="5570220" y="4777686"/>
+              <a:ext cx="434340" cy="274320"/>
+            </a:xfrm>
+            <a:prstGeom prst="rect">
+              <a:avLst/>
+            </a:prstGeom>
+            <a:noFill/>
+            <a:ln>
+              <a:noFill/>
+            </a:ln>
+          </p:spPr>
+          <p:style>
+            <a:lnRef idx="2">
+              <a:schemeClr val="accent1">
+                <a:shade val="50000"/>
+              </a:schemeClr>
+            </a:lnRef>
+            <a:fillRef idx="1">
+              <a:schemeClr val="accent1"/>
+            </a:fillRef>
+            <a:effectRef idx="0">
+              <a:schemeClr val="accent1"/>
+            </a:effectRef>
+            <a:fontRef idx="minor">
+              <a:schemeClr val="lt1"/>
+            </a:fontRef>
+          </p:style>
+          <p:txBody>
+            <a:bodyPr rtlCol="0" anchor="ctr"/>
+            <a:lstStyle/>
+            <a:p>
+              <a:pPr algn="ctr"/>
+              <a:r>
+                <a:rPr lang="en-US" altLang="ko-KR" sz="2800" dirty="0" smtClean="0">
+                  <a:solidFill>
+                    <a:schemeClr val="tx1"/>
+                  </a:solidFill>
+                </a:rPr>
+                <a:t>p</a:t>
+              </a:r>
+              <a:endParaRPr lang="ko-KR" altLang="en-US" sz="2800" dirty="0">
+                <a:solidFill>
+                  <a:schemeClr val="tx1"/>
+                </a:solidFill>
+              </a:endParaRPr>
+            </a:p>
+          </p:txBody>
+        </p:sp>
+        <p:sp>
+          <p:nvSpPr>
+            <p:cNvPr id="50" name="직사각형 49"/>
+            <p:cNvSpPr/>
+            <p:nvPr/>
+          </p:nvSpPr>
+          <p:spPr>
+            <a:xfrm>
+              <a:off x="2746925" y="3245672"/>
+              <a:ext cx="685801" cy="274320"/>
+            </a:xfrm>
+            <a:prstGeom prst="rect">
+              <a:avLst/>
+            </a:prstGeom>
+            <a:noFill/>
+            <a:ln>
+              <a:noFill/>
+            </a:ln>
+          </p:spPr>
+          <p:style>
+            <a:lnRef idx="2">
+              <a:schemeClr val="accent1">
+                <a:shade val="50000"/>
+              </a:schemeClr>
+            </a:lnRef>
+            <a:fillRef idx="1">
+              <a:schemeClr val="accent1"/>
+            </a:fillRef>
+            <a:effectRef idx="0">
+              <a:schemeClr val="accent1"/>
+            </a:effectRef>
+            <a:fontRef idx="minor">
+              <a:schemeClr val="lt1"/>
+            </a:fontRef>
+          </p:style>
+          <p:txBody>
+            <a:bodyPr rtlCol="0" anchor="ctr"/>
+            <a:lstStyle/>
+            <a:p>
+              <a:pPr algn="ctr"/>
+              <a:r>
+                <a:rPr lang="en-US" altLang="ko-KR" sz="2800" dirty="0" smtClean="0">
+                  <a:solidFill>
+                    <a:schemeClr val="tx1"/>
+                  </a:solidFill>
+                </a:rPr>
+                <a:t>h</a:t>
+              </a:r>
+              <a:r>
+                <a:rPr lang="en-US" altLang="ko-KR" sz="2800" baseline="-25000" dirty="0" smtClean="0">
+                  <a:solidFill>
+                    <a:schemeClr val="tx1"/>
+                  </a:solidFill>
+                </a:rPr>
+                <a:t>o</a:t>
+              </a:r>
+              <a:endParaRPr lang="ko-KR" altLang="en-US" sz="2800" baseline="-25000" dirty="0">
+                <a:solidFill>
+                  <a:schemeClr val="tx1"/>
+                </a:solidFill>
+              </a:endParaRPr>
+            </a:p>
+          </p:txBody>
+        </p:sp>
+        <p:cxnSp>
+          <p:nvCxnSpPr>
+            <p:cNvPr id="51" name="직선 화살표 연결선 50"/>
+            <p:cNvCxnSpPr/>
+            <p:nvPr/>
+          </p:nvCxnSpPr>
+          <p:spPr>
+            <a:xfrm flipV="1">
+              <a:off x="3432726" y="2441568"/>
+              <a:ext cx="0" cy="1738195"/>
+            </a:xfrm>
+            <a:prstGeom prst="straightConnector1">
+              <a:avLst/>
+            </a:prstGeom>
+            <a:ln>
+              <a:solidFill>
+                <a:schemeClr val="tx1"/>
+              </a:solidFill>
+              <a:headEnd type="triangle"/>
+              <a:tailEnd type="triangle"/>
+            </a:ln>
+          </p:spPr>
+          <p:style>
+            <a:lnRef idx="1">
+              <a:schemeClr val="accent1"/>
+            </a:lnRef>
+            <a:fillRef idx="0">
+              <a:schemeClr val="accent1"/>
+            </a:fillRef>
+            <a:effectRef idx="0">
+              <a:schemeClr val="accent1"/>
+            </a:effectRef>
+            <a:fontRef idx="minor">
+              <a:schemeClr val="tx1"/>
+            </a:fontRef>
+          </p:style>
+        </p:cxnSp>
+        <p:cxnSp>
+          <p:nvCxnSpPr>
+            <p:cNvPr id="23" name="직선 화살표 연결선 22"/>
+            <p:cNvCxnSpPr/>
+            <p:nvPr/>
+          </p:nvCxnSpPr>
+          <p:spPr>
+            <a:xfrm flipV="1">
+              <a:off x="1537424" y="1978430"/>
+              <a:ext cx="0" cy="2725615"/>
+            </a:xfrm>
+            <a:prstGeom prst="straightConnector1">
+              <a:avLst/>
+            </a:prstGeom>
+            <a:ln>
+              <a:solidFill>
+                <a:schemeClr val="tx1"/>
+              </a:solidFill>
+              <a:headEnd type="triangle"/>
+              <a:tailEnd type="triangle"/>
+            </a:ln>
+          </p:spPr>
+          <p:style>
+            <a:lnRef idx="1">
+              <a:schemeClr val="accent1"/>
+            </a:lnRef>
+            <a:fillRef idx="0">
+              <a:schemeClr val="accent1"/>
+            </a:fillRef>
+            <a:effectRef idx="0">
+              <a:schemeClr val="accent1"/>
+            </a:effectRef>
+            <a:fontRef idx="minor">
+              <a:schemeClr val="tx1"/>
+            </a:fontRef>
+          </p:style>
+        </p:cxnSp>
+        <p:cxnSp>
+          <p:nvCxnSpPr>
+            <p:cNvPr id="25" name="직선 연결선 24"/>
+            <p:cNvCxnSpPr/>
+            <p:nvPr/>
+          </p:nvCxnSpPr>
+          <p:spPr>
+            <a:xfrm flipH="1" flipV="1">
+              <a:off x="897775" y="1950698"/>
+              <a:ext cx="1151837" cy="1"/>
+            </a:xfrm>
+            <a:prstGeom prst="line">
+              <a:avLst/>
+            </a:prstGeom>
+            <a:ln>
+              <a:solidFill>
+                <a:schemeClr val="tx1"/>
+              </a:solidFill>
+            </a:ln>
+          </p:spPr>
+          <p:style>
+            <a:lnRef idx="1">
+              <a:schemeClr val="accent1"/>
+            </a:lnRef>
+            <a:fillRef idx="0">
+              <a:schemeClr val="accent1"/>
+            </a:fillRef>
+            <a:effectRef idx="0">
+              <a:schemeClr val="accent1"/>
+            </a:effectRef>
+            <a:fontRef idx="minor">
+              <a:schemeClr val="tx1"/>
+            </a:fontRef>
+          </p:style>
+        </p:cxnSp>
+        <p:cxnSp>
+          <p:nvCxnSpPr>
+            <p:cNvPr id="26" name="직선 연결선 25"/>
+            <p:cNvCxnSpPr/>
+            <p:nvPr/>
+          </p:nvCxnSpPr>
+          <p:spPr>
+            <a:xfrm flipH="1" flipV="1">
+              <a:off x="897775" y="4704045"/>
+              <a:ext cx="1151837" cy="1"/>
+            </a:xfrm>
+            <a:prstGeom prst="line">
+              <a:avLst/>
+            </a:prstGeom>
+            <a:ln>
+              <a:solidFill>
+                <a:schemeClr val="tx1"/>
+              </a:solidFill>
+            </a:ln>
+          </p:spPr>
+          <p:style>
+            <a:lnRef idx="1">
+              <a:schemeClr val="accent1"/>
+            </a:lnRef>
+            <a:fillRef idx="0">
+              <a:schemeClr val="accent1"/>
+            </a:fillRef>
+            <a:effectRef idx="0">
+              <a:schemeClr val="accent1"/>
+            </a:effectRef>
+            <a:fontRef idx="minor">
+              <a:schemeClr val="tx1"/>
+            </a:fontRef>
+          </p:style>
+        </p:cxnSp>
+        <p:sp>
+          <p:nvSpPr>
+            <p:cNvPr id="27" name="직사각형 26"/>
+            <p:cNvSpPr/>
+            <p:nvPr/>
+          </p:nvSpPr>
+          <p:spPr>
+            <a:xfrm>
+              <a:off x="986359" y="3245672"/>
+              <a:ext cx="685801" cy="274320"/>
+            </a:xfrm>
+            <a:prstGeom prst="rect">
+              <a:avLst/>
+            </a:prstGeom>
+            <a:noFill/>
+            <a:ln>
+              <a:noFill/>
+            </a:ln>
+          </p:spPr>
+          <p:style>
+            <a:lnRef idx="2">
+              <a:schemeClr val="accent1">
+                <a:shade val="50000"/>
+              </a:schemeClr>
+            </a:lnRef>
+            <a:fillRef idx="1">
+              <a:schemeClr val="accent1"/>
+            </a:fillRef>
+            <a:effectRef idx="0">
+              <a:schemeClr val="accent1"/>
+            </a:effectRef>
+            <a:fontRef idx="minor">
+              <a:schemeClr val="lt1"/>
+            </a:fontRef>
+          </p:style>
+          <p:txBody>
+            <a:bodyPr rtlCol="0" anchor="ctr"/>
+            <a:lstStyle/>
+            <a:p>
+              <a:pPr algn="ctr"/>
+              <a:r>
+                <a:rPr lang="en-US" altLang="ko-KR" sz="2800" dirty="0" smtClean="0">
+                  <a:solidFill>
+                    <a:schemeClr val="tx1"/>
+                  </a:solidFill>
+                </a:rPr>
+                <a:t>d</a:t>
+              </a:r>
+              <a:r>
+                <a:rPr lang="en-US" altLang="ko-KR" sz="2800" baseline="-25000" dirty="0" smtClean="0">
+                  <a:solidFill>
+                    <a:schemeClr val="tx1"/>
+                  </a:solidFill>
+                </a:rPr>
+                <a:t>c</a:t>
+              </a:r>
+              <a:endParaRPr lang="ko-KR" altLang="en-US" sz="2800" baseline="-25000" dirty="0">
+                <a:solidFill>
+                  <a:schemeClr val="tx1"/>
+                </a:solidFill>
+              </a:endParaRPr>
+            </a:p>
+          </p:txBody>
+        </p:sp>
+      </p:grpSp>
+      <p:grpSp>
+        <p:nvGrpSpPr>
+          <p:cNvPr id="28" name="그룹 27"/>
+          <p:cNvGrpSpPr/>
+          <p:nvPr/>
+        </p:nvGrpSpPr>
+        <p:grpSpPr>
+          <a:xfrm>
+            <a:off x="4581125" y="2355571"/>
+            <a:ext cx="4385425" cy="2243931"/>
+            <a:chOff x="897775" y="1950698"/>
+            <a:chExt cx="7385165" cy="3592279"/>
+          </a:xfrm>
+        </p:grpSpPr>
+        <p:cxnSp>
+          <p:nvCxnSpPr>
+            <p:cNvPr id="29" name="직선 연결선 28"/>
+            <p:cNvCxnSpPr/>
+            <p:nvPr/>
+          </p:nvCxnSpPr>
+          <p:spPr>
+            <a:xfrm>
+              <a:off x="2049612" y="1978429"/>
+              <a:ext cx="6126648" cy="0"/>
+            </a:xfrm>
+            <a:prstGeom prst="line">
+              <a:avLst/>
+            </a:prstGeom>
+            <a:ln w="63500">
+              <a:solidFill>
+                <a:schemeClr val="tx1"/>
+              </a:solidFill>
+            </a:ln>
+          </p:spPr>
+          <p:style>
+            <a:lnRef idx="1">
+              <a:schemeClr val="accent1"/>
+            </a:lnRef>
+            <a:fillRef idx="0">
+              <a:schemeClr val="accent1"/>
+            </a:fillRef>
+            <a:effectRef idx="0">
+              <a:schemeClr val="accent1"/>
+            </a:effectRef>
+            <a:fontRef idx="minor">
+              <a:schemeClr val="tx1"/>
+            </a:fontRef>
+          </p:style>
+        </p:cxnSp>
+        <p:cxnSp>
+          <p:nvCxnSpPr>
+            <p:cNvPr id="30" name="직선 연결선 29"/>
+            <p:cNvCxnSpPr/>
+            <p:nvPr/>
+          </p:nvCxnSpPr>
+          <p:spPr>
+            <a:xfrm>
+              <a:off x="2049612" y="2123614"/>
+              <a:ext cx="6126648" cy="0"/>
+            </a:xfrm>
+            <a:prstGeom prst="line">
+              <a:avLst/>
+            </a:prstGeom>
+            <a:ln w="63500">
+              <a:solidFill>
+                <a:schemeClr val="tx1"/>
+              </a:solidFill>
+            </a:ln>
+          </p:spPr>
+          <p:style>
+            <a:lnRef idx="1">
+              <a:schemeClr val="accent1"/>
+            </a:lnRef>
+            <a:fillRef idx="0">
+              <a:schemeClr val="accent1"/>
+            </a:fillRef>
+            <a:effectRef idx="0">
+              <a:schemeClr val="accent1"/>
+            </a:effectRef>
+            <a:fontRef idx="minor">
+              <a:schemeClr val="tx1"/>
+            </a:fontRef>
+          </p:style>
+        </p:cxnSp>
+        <p:cxnSp>
+          <p:nvCxnSpPr>
+            <p:cNvPr id="31" name="직선 연결선 30"/>
+            <p:cNvCxnSpPr/>
+            <p:nvPr/>
+          </p:nvCxnSpPr>
+          <p:spPr>
+            <a:xfrm>
+              <a:off x="2049612" y="4531129"/>
+              <a:ext cx="6233328" cy="0"/>
+            </a:xfrm>
+            <a:prstGeom prst="line">
+              <a:avLst/>
+            </a:prstGeom>
+            <a:ln w="63500">
+              <a:solidFill>
+                <a:schemeClr val="tx1"/>
+              </a:solidFill>
+            </a:ln>
+          </p:spPr>
+          <p:style>
+            <a:lnRef idx="1">
+              <a:schemeClr val="accent1"/>
+            </a:lnRef>
+            <a:fillRef idx="0">
+              <a:schemeClr val="accent1"/>
+            </a:fillRef>
+            <a:effectRef idx="0">
+              <a:schemeClr val="accent1"/>
+            </a:effectRef>
+            <a:fontRef idx="minor">
+              <a:schemeClr val="tx1"/>
+            </a:fontRef>
+          </p:style>
+        </p:cxnSp>
+        <p:cxnSp>
+          <p:nvCxnSpPr>
+            <p:cNvPr id="32" name="직선 연결선 31"/>
+            <p:cNvCxnSpPr/>
+            <p:nvPr/>
+          </p:nvCxnSpPr>
+          <p:spPr>
+            <a:xfrm>
+              <a:off x="2049612" y="4676314"/>
+              <a:ext cx="6233328" cy="0"/>
+            </a:xfrm>
+            <a:prstGeom prst="line">
+              <a:avLst/>
+            </a:prstGeom>
+            <a:ln w="63500">
+              <a:solidFill>
+                <a:schemeClr val="tx1"/>
+              </a:solidFill>
+            </a:ln>
+          </p:spPr>
+          <p:style>
+            <a:lnRef idx="1">
+              <a:schemeClr val="accent1"/>
+            </a:lnRef>
+            <a:fillRef idx="0">
+              <a:schemeClr val="accent1"/>
+            </a:fillRef>
+            <a:effectRef idx="0">
+              <a:schemeClr val="accent1"/>
+            </a:effectRef>
+            <a:fontRef idx="minor">
+              <a:schemeClr val="tx1"/>
+            </a:fontRef>
+          </p:style>
+        </p:cxnSp>
+        <p:sp>
+          <p:nvSpPr>
+            <p:cNvPr id="33" name="육각형 32"/>
+            <p:cNvSpPr/>
+            <p:nvPr/>
+          </p:nvSpPr>
+          <p:spPr>
+            <a:xfrm>
+              <a:off x="2522220" y="2441567"/>
+              <a:ext cx="1912620" cy="1743730"/>
+            </a:xfrm>
+            <a:prstGeom prst="hexagon">
+              <a:avLst/>
+            </a:prstGeom>
+            <a:noFill/>
+            <a:ln w="50800">
+              <a:solidFill>
+                <a:schemeClr val="tx1"/>
+              </a:solidFill>
+            </a:ln>
+          </p:spPr>
+          <p:style>
+            <a:lnRef idx="2">
+              <a:schemeClr val="accent1">
+                <a:shade val="50000"/>
+              </a:schemeClr>
+            </a:lnRef>
+            <a:fillRef idx="1">
+              <a:schemeClr val="accent1"/>
+            </a:fillRef>
+            <a:effectRef idx="0">
+              <a:schemeClr val="accent1"/>
+            </a:effectRef>
+            <a:fontRef idx="minor">
+              <a:schemeClr val="lt1"/>
+            </a:fontRef>
+          </p:style>
+          <p:txBody>
+            <a:bodyPr rtlCol="0" anchor="ctr"/>
+            <a:lstStyle/>
+            <a:p>
+              <a:pPr algn="ctr"/>
+              <a:endParaRPr lang="ko-KR" altLang="en-US"/>
+            </a:p>
+          </p:txBody>
+        </p:sp>
+        <p:sp>
+          <p:nvSpPr>
+            <p:cNvPr id="34" name="육각형 33"/>
+            <p:cNvSpPr/>
+            <p:nvPr/>
+          </p:nvSpPr>
+          <p:spPr>
+            <a:xfrm>
+              <a:off x="5570220" y="2441567"/>
+              <a:ext cx="1912620" cy="1743730"/>
+            </a:xfrm>
+            <a:prstGeom prst="hexagon">
+              <a:avLst/>
+            </a:prstGeom>
+            <a:noFill/>
+            <a:ln w="50800">
+              <a:solidFill>
+                <a:schemeClr val="tx1"/>
+              </a:solidFill>
+            </a:ln>
+          </p:spPr>
+          <p:style>
+            <a:lnRef idx="2">
+              <a:schemeClr val="accent1">
+                <a:shade val="50000"/>
+              </a:schemeClr>
+            </a:lnRef>
+            <a:fillRef idx="1">
+              <a:schemeClr val="accent1"/>
+            </a:fillRef>
+            <a:effectRef idx="0">
+              <a:schemeClr val="accent1"/>
+            </a:effectRef>
+            <a:fontRef idx="minor">
+              <a:schemeClr val="lt1"/>
+            </a:fontRef>
+          </p:style>
+          <p:txBody>
+            <a:bodyPr rtlCol="0" anchor="ctr"/>
+            <a:lstStyle/>
+            <a:p>
+              <a:pPr algn="ctr"/>
+              <a:endParaRPr lang="ko-KR" altLang="en-US"/>
+            </a:p>
+          </p:txBody>
+        </p:sp>
+        <p:cxnSp>
+          <p:nvCxnSpPr>
+            <p:cNvPr id="35" name="직선 화살표 연결선 34"/>
+            <p:cNvCxnSpPr>
+              <a:stCxn id="33" idx="0"/>
+              <a:endCxn id="34" idx="3"/>
+            </p:cNvCxnSpPr>
+            <p:nvPr/>
+          </p:nvCxnSpPr>
+          <p:spPr>
+            <a:xfrm>
+              <a:off x="4434840" y="3313432"/>
+              <a:ext cx="1135380" cy="0"/>
+            </a:xfrm>
+            <a:prstGeom prst="straightConnector1">
+              <a:avLst/>
+            </a:prstGeom>
+            <a:ln>
+              <a:solidFill>
+                <a:schemeClr val="tx1"/>
+              </a:solidFill>
+              <a:headEnd type="triangle"/>
+              <a:tailEnd type="triangle"/>
+            </a:ln>
+          </p:spPr>
+          <p:style>
+            <a:lnRef idx="1">
+              <a:schemeClr val="accent1"/>
+            </a:lnRef>
+            <a:fillRef idx="0">
+              <a:schemeClr val="accent1"/>
+            </a:fillRef>
+            <a:effectRef idx="0">
+              <a:schemeClr val="accent1"/>
+            </a:effectRef>
+            <a:fontRef idx="minor">
+              <a:schemeClr val="tx1"/>
+            </a:fontRef>
+          </p:style>
+        </p:cxnSp>
+        <p:sp>
+          <p:nvSpPr>
+            <p:cNvPr id="36" name="직사각형 35"/>
+            <p:cNvSpPr/>
+            <p:nvPr/>
+          </p:nvSpPr>
+          <p:spPr>
+            <a:xfrm>
+              <a:off x="4731936" y="2987860"/>
+              <a:ext cx="434340" cy="274320"/>
+            </a:xfrm>
+            <a:prstGeom prst="rect">
+              <a:avLst/>
+            </a:prstGeom>
+            <a:noFill/>
+            <a:ln>
+              <a:noFill/>
+            </a:ln>
+          </p:spPr>
+          <p:style>
+            <a:lnRef idx="2">
+              <a:schemeClr val="accent1">
+                <a:shade val="50000"/>
+              </a:schemeClr>
+            </a:lnRef>
+            <a:fillRef idx="1">
+              <a:schemeClr val="accent1"/>
+            </a:fillRef>
+            <a:effectRef idx="0">
+              <a:schemeClr val="accent1"/>
+            </a:effectRef>
+            <a:fontRef idx="minor">
+              <a:schemeClr val="lt1"/>
+            </a:fontRef>
+          </p:style>
+          <p:txBody>
+            <a:bodyPr rtlCol="0" anchor="ctr"/>
+            <a:lstStyle/>
+            <a:p>
+              <a:pPr algn="ctr"/>
+              <a:r>
+                <a:rPr lang="en-US" altLang="ko-KR" sz="2800" dirty="0" smtClean="0">
+                  <a:solidFill>
+                    <a:schemeClr val="tx1"/>
+                  </a:solidFill>
+                </a:rPr>
+                <a:t>e</a:t>
+              </a:r>
+              <a:endParaRPr lang="ko-KR" altLang="en-US" sz="2800" dirty="0">
+                <a:solidFill>
+                  <a:schemeClr val="tx1"/>
+                </a:solidFill>
+              </a:endParaRPr>
+            </a:p>
+          </p:txBody>
+        </p:sp>
+        <p:cxnSp>
+          <p:nvCxnSpPr>
+            <p:cNvPr id="37" name="직선 화살표 연결선 36"/>
+            <p:cNvCxnSpPr/>
+            <p:nvPr/>
+          </p:nvCxnSpPr>
+          <p:spPr>
+            <a:xfrm>
+              <a:off x="4414736" y="5088892"/>
+              <a:ext cx="3068104" cy="0"/>
+            </a:xfrm>
+            <a:prstGeom prst="straightConnector1">
+              <a:avLst/>
+            </a:prstGeom>
+            <a:ln>
+              <a:solidFill>
+                <a:schemeClr val="tx1"/>
+              </a:solidFill>
+              <a:headEnd type="triangle"/>
+              <a:tailEnd type="triangle"/>
+            </a:ln>
+          </p:spPr>
+          <p:style>
+            <a:lnRef idx="1">
+              <a:schemeClr val="accent1"/>
+            </a:lnRef>
+            <a:fillRef idx="0">
+              <a:schemeClr val="accent1"/>
+            </a:fillRef>
+            <a:effectRef idx="0">
+              <a:schemeClr val="accent1"/>
+            </a:effectRef>
+            <a:fontRef idx="minor">
+              <a:schemeClr val="tx1"/>
+            </a:fontRef>
+          </p:style>
+        </p:cxnSp>
+        <p:cxnSp>
+          <p:nvCxnSpPr>
+            <p:cNvPr id="38" name="직선 연결선 37"/>
+            <p:cNvCxnSpPr>
+              <a:stCxn id="33" idx="0"/>
+            </p:cNvCxnSpPr>
+            <p:nvPr/>
+          </p:nvCxnSpPr>
+          <p:spPr>
+            <a:xfrm>
+              <a:off x="4434840" y="3313432"/>
+              <a:ext cx="0" cy="2229545"/>
+            </a:xfrm>
+            <a:prstGeom prst="line">
+              <a:avLst/>
+            </a:prstGeom>
+            <a:ln>
+              <a:solidFill>
+                <a:schemeClr val="tx1"/>
+              </a:solidFill>
+            </a:ln>
+          </p:spPr>
+          <p:style>
+            <a:lnRef idx="1">
+              <a:schemeClr val="accent1"/>
+            </a:lnRef>
+            <a:fillRef idx="0">
+              <a:schemeClr val="accent1"/>
+            </a:fillRef>
+            <a:effectRef idx="0">
+              <a:schemeClr val="accent1"/>
+            </a:effectRef>
+            <a:fontRef idx="minor">
+              <a:schemeClr val="tx1"/>
+            </a:fontRef>
+          </p:style>
+        </p:cxnSp>
+        <p:cxnSp>
+          <p:nvCxnSpPr>
+            <p:cNvPr id="39" name="직선 연결선 38"/>
+            <p:cNvCxnSpPr/>
+            <p:nvPr/>
+          </p:nvCxnSpPr>
+          <p:spPr>
+            <a:xfrm>
+              <a:off x="7482840" y="3313432"/>
+              <a:ext cx="0" cy="2229545"/>
+            </a:xfrm>
+            <a:prstGeom prst="line">
+              <a:avLst/>
+            </a:prstGeom>
+            <a:ln>
+              <a:solidFill>
+                <a:schemeClr val="tx1"/>
+              </a:solidFill>
+            </a:ln>
+          </p:spPr>
+          <p:style>
+            <a:lnRef idx="1">
+              <a:schemeClr val="accent1"/>
+            </a:lnRef>
+            <a:fillRef idx="0">
+              <a:schemeClr val="accent1"/>
+            </a:fillRef>
+            <a:effectRef idx="0">
+              <a:schemeClr val="accent1"/>
+            </a:effectRef>
+            <a:fontRef idx="minor">
+              <a:schemeClr val="tx1"/>
+            </a:fontRef>
+          </p:style>
+        </p:cxnSp>
+        <p:sp>
+          <p:nvSpPr>
+            <p:cNvPr id="40" name="직사각형 39"/>
+            <p:cNvSpPr/>
+            <p:nvPr/>
+          </p:nvSpPr>
+          <p:spPr>
+            <a:xfrm>
+              <a:off x="5570220" y="4777686"/>
+              <a:ext cx="434340" cy="274320"/>
+            </a:xfrm>
+            <a:prstGeom prst="rect">
+              <a:avLst/>
+            </a:prstGeom>
+            <a:noFill/>
+            <a:ln>
+              <a:noFill/>
+            </a:ln>
+          </p:spPr>
+          <p:style>
+            <a:lnRef idx="2">
+              <a:schemeClr val="accent1">
+                <a:shade val="50000"/>
+              </a:schemeClr>
+            </a:lnRef>
+            <a:fillRef idx="1">
+              <a:schemeClr val="accent1"/>
+            </a:fillRef>
+            <a:effectRef idx="0">
+              <a:schemeClr val="accent1"/>
+            </a:effectRef>
+            <a:fontRef idx="minor">
+              <a:schemeClr val="lt1"/>
+            </a:fontRef>
+          </p:style>
+          <p:txBody>
+            <a:bodyPr rtlCol="0" anchor="ctr"/>
+            <a:lstStyle/>
+            <a:p>
+              <a:pPr algn="ctr"/>
+              <a:r>
+                <a:rPr lang="en-US" altLang="ko-KR" sz="2800" dirty="0" smtClean="0">
+                  <a:solidFill>
+                    <a:schemeClr val="tx1"/>
+                  </a:solidFill>
+                </a:rPr>
+                <a:t>p</a:t>
+              </a:r>
+              <a:endParaRPr lang="ko-KR" altLang="en-US" sz="2800" dirty="0">
+                <a:solidFill>
+                  <a:schemeClr val="tx1"/>
+                </a:solidFill>
+              </a:endParaRPr>
+            </a:p>
+          </p:txBody>
+        </p:sp>
+        <p:sp>
+          <p:nvSpPr>
+            <p:cNvPr id="43" name="직사각형 42"/>
+            <p:cNvSpPr/>
+            <p:nvPr/>
+          </p:nvSpPr>
+          <p:spPr>
+            <a:xfrm>
+              <a:off x="2746925" y="3245672"/>
+              <a:ext cx="685801" cy="274320"/>
+            </a:xfrm>
+            <a:prstGeom prst="rect">
+              <a:avLst/>
+            </a:prstGeom>
+            <a:noFill/>
+            <a:ln>
+              <a:noFill/>
+            </a:ln>
+          </p:spPr>
+          <p:style>
+            <a:lnRef idx="2">
+              <a:schemeClr val="accent1">
+                <a:shade val="50000"/>
+              </a:schemeClr>
+            </a:lnRef>
+            <a:fillRef idx="1">
+              <a:schemeClr val="accent1"/>
+            </a:fillRef>
+            <a:effectRef idx="0">
+              <a:schemeClr val="accent1"/>
+            </a:effectRef>
+            <a:fontRef idx="minor">
+              <a:schemeClr val="lt1"/>
+            </a:fontRef>
+          </p:style>
+          <p:txBody>
+            <a:bodyPr rtlCol="0" anchor="ctr"/>
+            <a:lstStyle/>
+            <a:p>
+              <a:pPr algn="ctr"/>
+              <a:r>
+                <a:rPr lang="en-US" altLang="ko-KR" sz="2800" dirty="0" smtClean="0">
+                  <a:solidFill>
+                    <a:schemeClr val="tx1"/>
+                  </a:solidFill>
+                </a:rPr>
+                <a:t>h</a:t>
+              </a:r>
+              <a:r>
+                <a:rPr lang="en-US" altLang="ko-KR" sz="2800" baseline="-25000" dirty="0" smtClean="0">
+                  <a:solidFill>
+                    <a:schemeClr val="tx1"/>
+                  </a:solidFill>
+                </a:rPr>
+                <a:t>o</a:t>
+              </a:r>
+              <a:endParaRPr lang="ko-KR" altLang="en-US" sz="2800" baseline="-25000" dirty="0">
+                <a:solidFill>
+                  <a:schemeClr val="tx1"/>
+                </a:solidFill>
+              </a:endParaRPr>
+            </a:p>
+          </p:txBody>
+        </p:sp>
+        <p:cxnSp>
+          <p:nvCxnSpPr>
+            <p:cNvPr id="44" name="직선 화살표 연결선 43"/>
+            <p:cNvCxnSpPr/>
+            <p:nvPr/>
+          </p:nvCxnSpPr>
+          <p:spPr>
+            <a:xfrm flipV="1">
+              <a:off x="3432726" y="2441568"/>
+              <a:ext cx="0" cy="1738195"/>
+            </a:xfrm>
+            <a:prstGeom prst="straightConnector1">
+              <a:avLst/>
+            </a:prstGeom>
+            <a:ln>
+              <a:solidFill>
+                <a:schemeClr val="tx1"/>
+              </a:solidFill>
+              <a:headEnd type="triangle"/>
+              <a:tailEnd type="triangle"/>
+            </a:ln>
+          </p:spPr>
+          <p:style>
+            <a:lnRef idx="1">
+              <a:schemeClr val="accent1"/>
+            </a:lnRef>
+            <a:fillRef idx="0">
+              <a:schemeClr val="accent1"/>
+            </a:fillRef>
+            <a:effectRef idx="0">
+              <a:schemeClr val="accent1"/>
+            </a:effectRef>
+            <a:fontRef idx="minor">
+              <a:schemeClr val="tx1"/>
+            </a:fontRef>
+          </p:style>
+        </p:cxnSp>
+        <p:cxnSp>
+          <p:nvCxnSpPr>
+            <p:cNvPr id="45" name="직선 화살표 연결선 44"/>
+            <p:cNvCxnSpPr/>
+            <p:nvPr/>
+          </p:nvCxnSpPr>
+          <p:spPr>
+            <a:xfrm flipV="1">
+              <a:off x="1537424" y="1978430"/>
+              <a:ext cx="0" cy="2725615"/>
+            </a:xfrm>
+            <a:prstGeom prst="straightConnector1">
+              <a:avLst/>
+            </a:prstGeom>
+            <a:ln>
+              <a:solidFill>
+                <a:schemeClr val="tx1"/>
+              </a:solidFill>
+              <a:headEnd type="triangle"/>
+              <a:tailEnd type="triangle"/>
+            </a:ln>
+          </p:spPr>
+          <p:style>
+            <a:lnRef idx="1">
+              <a:schemeClr val="accent1"/>
+            </a:lnRef>
+            <a:fillRef idx="0">
+              <a:schemeClr val="accent1"/>
+            </a:fillRef>
+            <a:effectRef idx="0">
+              <a:schemeClr val="accent1"/>
+            </a:effectRef>
+            <a:fontRef idx="minor">
+              <a:schemeClr val="tx1"/>
+            </a:fontRef>
+          </p:style>
+        </p:cxnSp>
+        <p:cxnSp>
+          <p:nvCxnSpPr>
+            <p:cNvPr id="48" name="직선 연결선 47"/>
+            <p:cNvCxnSpPr/>
+            <p:nvPr/>
+          </p:nvCxnSpPr>
+          <p:spPr>
+            <a:xfrm flipH="1" flipV="1">
+              <a:off x="897775" y="1950698"/>
+              <a:ext cx="1151837" cy="1"/>
+            </a:xfrm>
+            <a:prstGeom prst="line">
+              <a:avLst/>
+            </a:prstGeom>
+            <a:ln>
+              <a:solidFill>
+                <a:schemeClr val="tx1"/>
+              </a:solidFill>
+            </a:ln>
+          </p:spPr>
+          <p:style>
+            <a:lnRef idx="1">
+              <a:schemeClr val="accent1"/>
+            </a:lnRef>
+            <a:fillRef idx="0">
+              <a:schemeClr val="accent1"/>
+            </a:fillRef>
+            <a:effectRef idx="0">
+              <a:schemeClr val="accent1"/>
+            </a:effectRef>
+            <a:fontRef idx="minor">
+              <a:schemeClr val="tx1"/>
+            </a:fontRef>
+          </p:style>
+        </p:cxnSp>
+        <p:cxnSp>
+          <p:nvCxnSpPr>
+            <p:cNvPr id="52" name="직선 연결선 51"/>
+            <p:cNvCxnSpPr/>
+            <p:nvPr/>
+          </p:nvCxnSpPr>
+          <p:spPr>
+            <a:xfrm flipH="1" flipV="1">
+              <a:off x="897775" y="4704045"/>
+              <a:ext cx="1151837" cy="1"/>
+            </a:xfrm>
+            <a:prstGeom prst="line">
+              <a:avLst/>
+            </a:prstGeom>
+            <a:ln>
+              <a:solidFill>
+                <a:schemeClr val="tx1"/>
+              </a:solidFill>
+            </a:ln>
+          </p:spPr>
+          <p:style>
+            <a:lnRef idx="1">
+              <a:schemeClr val="accent1"/>
+            </a:lnRef>
+            <a:fillRef idx="0">
+              <a:schemeClr val="accent1"/>
+            </a:fillRef>
+            <a:effectRef idx="0">
+              <a:schemeClr val="accent1"/>
+            </a:effectRef>
+            <a:fontRef idx="minor">
+              <a:schemeClr val="tx1"/>
+            </a:fontRef>
+          </p:style>
+        </p:cxnSp>
+        <p:sp>
+          <p:nvSpPr>
+            <p:cNvPr id="53" name="직사각형 52"/>
+            <p:cNvSpPr/>
+            <p:nvPr/>
+          </p:nvSpPr>
+          <p:spPr>
+            <a:xfrm>
+              <a:off x="986359" y="3245672"/>
+              <a:ext cx="685801" cy="274320"/>
+            </a:xfrm>
+            <a:prstGeom prst="rect">
+              <a:avLst/>
+            </a:prstGeom>
+            <a:noFill/>
+            <a:ln>
+              <a:noFill/>
+            </a:ln>
+          </p:spPr>
+          <p:style>
+            <a:lnRef idx="2">
+              <a:schemeClr val="accent1">
+                <a:shade val="50000"/>
+              </a:schemeClr>
+            </a:lnRef>
+            <a:fillRef idx="1">
+              <a:schemeClr val="accent1"/>
+            </a:fillRef>
+            <a:effectRef idx="0">
+              <a:schemeClr val="accent1"/>
+            </a:effectRef>
+            <a:fontRef idx="minor">
+              <a:schemeClr val="lt1"/>
+            </a:fontRef>
+          </p:style>
+          <p:txBody>
+            <a:bodyPr rtlCol="0" anchor="ctr"/>
+            <a:lstStyle/>
+            <a:p>
+              <a:pPr algn="ctr"/>
+              <a:r>
+                <a:rPr lang="en-US" altLang="ko-KR" sz="2800" dirty="0" smtClean="0">
+                  <a:solidFill>
+                    <a:schemeClr val="tx1"/>
+                  </a:solidFill>
+                </a:rPr>
+                <a:t>d</a:t>
+              </a:r>
+              <a:r>
+                <a:rPr lang="en-US" altLang="ko-KR" sz="2800" baseline="-25000" dirty="0" smtClean="0">
+                  <a:solidFill>
+                    <a:schemeClr val="tx1"/>
+                  </a:solidFill>
+                </a:rPr>
+                <a:t>c</a:t>
+              </a:r>
+              <a:endParaRPr lang="ko-KR" altLang="en-US" sz="2800" baseline="-25000" dirty="0">
+                <a:solidFill>
+                  <a:schemeClr val="tx1"/>
+                </a:solidFill>
+              </a:endParaRPr>
+            </a:p>
+          </p:txBody>
+        </p:sp>
+      </p:grpSp>
+    </p:spTree>
+    <p:extLst>
+      <p:ext uri="{BB962C8B-B14F-4D97-AF65-F5344CB8AC3E}">
+        <p14:creationId xmlns:p14="http://schemas.microsoft.com/office/powerpoint/2010/main" val="3513591094"/>
+      </p:ext>
+    </p:extLst>
+  </p:cSld>
+  <p:clrMapOvr>
+    <a:masterClrMapping/>
+  </p:clrMapOvr>
+</p:sld>
+</file>
+
+<file path=ppt/slides/slide2.xml><?xml version="1.0" encoding="utf-8"?>
+<p:sld xmlns:a="http://schemas.openxmlformats.org/drawingml/2006/main" xmlns:r="http://schemas.openxmlformats.org/officeDocument/2006/relationships" xmlns:p="http://schemas.openxmlformats.org/presentationml/2006/main">
+  <p:cSld>
+    <p:spTree>
+      <p:nvGrpSpPr>
+        <p:cNvPr id="1" name=""/>
+        <p:cNvGrpSpPr/>
+        <p:nvPr/>
+      </p:nvGrpSpPr>
+      <p:grpSpPr>
+        <a:xfrm>
+          <a:off x="0" y="0"/>
+          <a:ext cx="0" cy="0"/>
+          <a:chOff x="0" y="0"/>
+          <a:chExt cx="0" cy="0"/>
+        </a:xfrm>
+      </p:grpSpPr>
+      <p:sp>
+        <p:nvSpPr>
+          <p:cNvPr id="4" name="AutoShape 2" descr="Castellated beam opening geometry [4]. "/>
+          <p:cNvSpPr>
+            <a:spLocks noChangeAspect="1" noChangeArrowheads="1"/>
+          </p:cNvSpPr>
+          <p:nvPr/>
+        </p:nvSpPr>
+        <p:spPr bwMode="auto">
+          <a:xfrm>
+            <a:off x="155575" y="-144463"/>
+            <a:ext cx="304800" cy="304801"/>
+          </a:xfrm>
+          <a:prstGeom prst="rect">
+            <a:avLst/>
+          </a:prstGeom>
+          <a:noFill/>
+          <a:extLst>
+            <a:ext uri="{909E8E84-426E-40DD-AFC4-6F175D3DCCD1}">
+              <a14:hiddenFill xmlns:a14="http://schemas.microsoft.com/office/drawing/2010/main">
+                <a:solidFill>
+                  <a:srgbClr val="FFFFFF"/>
+                </a:solidFill>
+              </a14:hiddenFill>
+            </a:ext>
+          </a:extLst>
+        </p:spPr>
+        <p:txBody>
+          <a:bodyPr vert="horz" wrap="square" lIns="91440" tIns="45720" rIns="91440" bIns="45720" numCol="1" anchor="t" anchorCtr="0" compatLnSpc="1">
+            <a:prstTxWarp prst="textNoShape">
+              <a:avLst/>
+            </a:prstTxWarp>
+          </a:bodyPr>
+          <a:lstStyle/>
+          <a:p>
+            <a:endParaRPr lang="ko-KR" altLang="en-US"/>
+          </a:p>
+        </p:txBody>
+      </p:sp>
       <p:cxnSp>
         <p:nvCxnSpPr>
           <p:cNvPr id="15" name="직선 연결선 14"/>
@@ -3016,8 +4646,8 @@
         </p:nvCxnSpPr>
         <p:spPr>
           <a:xfrm>
-            <a:off x="2049612" y="1978429"/>
-            <a:ext cx="6126648" cy="0"/>
+            <a:off x="1724824" y="1226755"/>
+            <a:ext cx="3638098" cy="0"/>
           </a:xfrm>
           <a:prstGeom prst="line">
             <a:avLst/>
@@ -3051,8 +4681,8 @@
         </p:nvCxnSpPr>
         <p:spPr>
           <a:xfrm>
-            <a:off x="2049612" y="2123614"/>
-            <a:ext cx="6126648" cy="0"/>
+            <a:off x="1724824" y="1317446"/>
+            <a:ext cx="3638098" cy="0"/>
           </a:xfrm>
           <a:prstGeom prst="line">
             <a:avLst/>
@@ -3086,8 +4716,8 @@
         </p:nvCxnSpPr>
         <p:spPr>
           <a:xfrm>
-            <a:off x="2049612" y="4531129"/>
-            <a:ext cx="6233328" cy="0"/>
+            <a:off x="1724824" y="2821309"/>
+            <a:ext cx="3701446" cy="0"/>
           </a:xfrm>
           <a:prstGeom prst="line">
             <a:avLst/>
@@ -3121,8 +4751,8 @@
         </p:nvCxnSpPr>
         <p:spPr>
           <a:xfrm>
-            <a:off x="2049612" y="4676314"/>
-            <a:ext cx="6233328" cy="0"/>
+            <a:off x="1724824" y="2912000"/>
+            <a:ext cx="3701446" cy="0"/>
           </a:xfrm>
           <a:prstGeom prst="line">
             <a:avLst/>
@@ -3156,8 +4786,8 @@
         </p:nvSpPr>
         <p:spPr>
           <a:xfrm>
-            <a:off x="2522220" y="2441567"/>
-            <a:ext cx="1912620" cy="1743730"/>
+            <a:off x="2005466" y="1516056"/>
+            <a:ext cx="1135743" cy="1089228"/>
           </a:xfrm>
           <a:prstGeom prst="hexagon">
             <a:avLst/>
@@ -3202,8 +4832,8 @@
         </p:nvSpPr>
         <p:spPr>
           <a:xfrm>
-            <a:off x="5570220" y="2441567"/>
-            <a:ext cx="1912620" cy="1743730"/>
+            <a:off x="3815415" y="1516056"/>
+            <a:ext cx="1135743" cy="1089228"/>
           </a:xfrm>
           <a:prstGeom prst="hexagon">
             <a:avLst/>
@@ -3242,120 +4872,22 @@
       </p:sp>
       <p:cxnSp>
         <p:nvCxnSpPr>
-          <p:cNvPr id="24" name="직선 화살표 연결선 23"/>
-          <p:cNvCxnSpPr>
-            <a:stCxn id="21" idx="0"/>
-            <a:endCxn id="22" idx="3"/>
-          </p:cNvCxnSpPr>
-          <p:nvPr/>
-        </p:nvCxnSpPr>
-        <p:spPr>
-          <a:xfrm>
-            <a:off x="4434840" y="3313432"/>
-            <a:ext cx="1135380" cy="0"/>
-          </a:xfrm>
-          <a:prstGeom prst="straightConnector1">
-            <a:avLst/>
-          </a:prstGeom>
-          <a:ln>
-            <a:solidFill>
-              <a:schemeClr val="tx1"/>
-            </a:solidFill>
-            <a:headEnd type="triangle"/>
-            <a:tailEnd type="triangle"/>
-          </a:ln>
-        </p:spPr>
-        <p:style>
-          <a:lnRef idx="1">
-            <a:schemeClr val="accent1"/>
-          </a:lnRef>
-          <a:fillRef idx="0">
-            <a:schemeClr val="accent1"/>
-          </a:fillRef>
-          <a:effectRef idx="0">
-            <a:schemeClr val="accent1"/>
-          </a:effectRef>
-          <a:fontRef idx="minor">
-            <a:schemeClr val="tx1"/>
-          </a:fontRef>
-        </p:style>
-      </p:cxnSp>
-      <p:sp>
-        <p:nvSpPr>
-          <p:cNvPr id="41" name="직사각형 40"/>
-          <p:cNvSpPr/>
-          <p:nvPr/>
-        </p:nvSpPr>
-        <p:spPr>
-          <a:xfrm>
-            <a:off x="4731936" y="2987860"/>
-            <a:ext cx="434340" cy="274320"/>
-          </a:xfrm>
-          <a:prstGeom prst="rect">
-            <a:avLst/>
-          </a:prstGeom>
-          <a:noFill/>
-          <a:ln>
-            <a:noFill/>
-          </a:ln>
-        </p:spPr>
-        <p:style>
-          <a:lnRef idx="2">
-            <a:schemeClr val="accent1">
-              <a:shade val="50000"/>
-            </a:schemeClr>
-          </a:lnRef>
-          <a:fillRef idx="1">
-            <a:schemeClr val="accent1"/>
-          </a:fillRef>
-          <a:effectRef idx="0">
-            <a:schemeClr val="accent1"/>
-          </a:effectRef>
-          <a:fontRef idx="minor">
-            <a:schemeClr val="lt1"/>
-          </a:fontRef>
-        </p:style>
-        <p:txBody>
-          <a:bodyPr rtlCol="0" anchor="ctr"/>
-          <a:lstStyle/>
-          <a:p>
-            <a:pPr algn="ctr"/>
-            <a:r>
-              <a:rPr lang="en-US" altLang="ko-KR" sz="2800" dirty="0" smtClean="0">
-                <a:solidFill>
-                  <a:schemeClr val="tx1"/>
-                </a:solidFill>
-              </a:rPr>
-              <a:t>e</a:t>
-            </a:r>
-            <a:endParaRPr lang="ko-KR" altLang="en-US" sz="2800" dirty="0">
-              <a:solidFill>
-                <a:schemeClr val="tx1"/>
-              </a:solidFill>
-            </a:endParaRPr>
-          </a:p>
-        </p:txBody>
-      </p:sp>
-      <p:cxnSp>
-        <p:nvCxnSpPr>
-          <p:cNvPr id="42" name="직선 화살표 연결선 41"/>
+          <p:cNvPr id="29" name="직선 연결선 28"/>
           <p:cNvCxnSpPr/>
           <p:nvPr/>
         </p:nvCxnSpPr>
         <p:spPr>
           <a:xfrm>
-            <a:off x="4414736" y="5088892"/>
-            <a:ext cx="3068104" cy="0"/>
-          </a:xfrm>
-          <a:prstGeom prst="straightConnector1">
+            <a:off x="6104859" y="1225228"/>
+            <a:ext cx="3638098" cy="0"/>
+          </a:xfrm>
+          <a:prstGeom prst="line">
             <a:avLst/>
           </a:prstGeom>
-          <a:ln>
+          <a:ln w="63500">
             <a:solidFill>
               <a:schemeClr val="tx1"/>
             </a:solidFill>
-            <a:headEnd type="triangle"/>
-            <a:tailEnd type="triangle"/>
           </a:ln>
         </p:spPr>
         <p:style>
@@ -3375,21 +4907,19 @@
       </p:cxnSp>
       <p:cxnSp>
         <p:nvCxnSpPr>
-          <p:cNvPr id="46" name="직선 연결선 45"/>
-          <p:cNvCxnSpPr>
-            <a:stCxn id="21" idx="0"/>
-          </p:cNvCxnSpPr>
+          <p:cNvPr id="30" name="직선 연결선 29"/>
+          <p:cNvCxnSpPr/>
           <p:nvPr/>
         </p:nvCxnSpPr>
         <p:spPr>
           <a:xfrm>
-            <a:off x="4434840" y="3313432"/>
-            <a:ext cx="0" cy="2229545"/>
+            <a:off x="6104859" y="1315919"/>
+            <a:ext cx="3638098" cy="0"/>
           </a:xfrm>
           <a:prstGeom prst="line">
             <a:avLst/>
           </a:prstGeom>
-          <a:ln>
+          <a:ln w="63500">
             <a:solidFill>
               <a:schemeClr val="tx1"/>
             </a:solidFill>
@@ -3412,179 +4942,22 @@
       </p:cxnSp>
       <p:cxnSp>
         <p:nvCxnSpPr>
-          <p:cNvPr id="47" name="직선 연결선 46"/>
+          <p:cNvPr id="31" name="직선 연결선 30"/>
           <p:cNvCxnSpPr/>
           <p:nvPr/>
         </p:nvCxnSpPr>
         <p:spPr>
           <a:xfrm>
-            <a:off x="7482840" y="3313432"/>
-            <a:ext cx="0" cy="2229545"/>
+            <a:off x="6104859" y="2819782"/>
+            <a:ext cx="3701446" cy="0"/>
           </a:xfrm>
           <a:prstGeom prst="line">
             <a:avLst/>
           </a:prstGeom>
-          <a:ln>
+          <a:ln w="63500">
             <a:solidFill>
               <a:schemeClr val="tx1"/>
             </a:solidFill>
-          </a:ln>
-        </p:spPr>
-        <p:style>
-          <a:lnRef idx="1">
-            <a:schemeClr val="accent1"/>
-          </a:lnRef>
-          <a:fillRef idx="0">
-            <a:schemeClr val="accent1"/>
-          </a:fillRef>
-          <a:effectRef idx="0">
-            <a:schemeClr val="accent1"/>
-          </a:effectRef>
-          <a:fontRef idx="minor">
-            <a:schemeClr val="tx1"/>
-          </a:fontRef>
-        </p:style>
-      </p:cxnSp>
-      <p:sp>
-        <p:nvSpPr>
-          <p:cNvPr id="49" name="직사각형 48"/>
-          <p:cNvSpPr/>
-          <p:nvPr/>
-        </p:nvSpPr>
-        <p:spPr>
-          <a:xfrm>
-            <a:off x="5570220" y="4777686"/>
-            <a:ext cx="434340" cy="274320"/>
-          </a:xfrm>
-          <a:prstGeom prst="rect">
-            <a:avLst/>
-          </a:prstGeom>
-          <a:noFill/>
-          <a:ln>
-            <a:noFill/>
-          </a:ln>
-        </p:spPr>
-        <p:style>
-          <a:lnRef idx="2">
-            <a:schemeClr val="accent1">
-              <a:shade val="50000"/>
-            </a:schemeClr>
-          </a:lnRef>
-          <a:fillRef idx="1">
-            <a:schemeClr val="accent1"/>
-          </a:fillRef>
-          <a:effectRef idx="0">
-            <a:schemeClr val="accent1"/>
-          </a:effectRef>
-          <a:fontRef idx="minor">
-            <a:schemeClr val="lt1"/>
-          </a:fontRef>
-        </p:style>
-        <p:txBody>
-          <a:bodyPr rtlCol="0" anchor="ctr"/>
-          <a:lstStyle/>
-          <a:p>
-            <a:pPr algn="ctr"/>
-            <a:r>
-              <a:rPr lang="en-US" altLang="ko-KR" sz="2800" dirty="0" smtClean="0">
-                <a:solidFill>
-                  <a:schemeClr val="tx1"/>
-                </a:solidFill>
-              </a:rPr>
-              <a:t>p</a:t>
-            </a:r>
-            <a:endParaRPr lang="ko-KR" altLang="en-US" sz="2800" dirty="0">
-              <a:solidFill>
-                <a:schemeClr val="tx1"/>
-              </a:solidFill>
-            </a:endParaRPr>
-          </a:p>
-        </p:txBody>
-      </p:sp>
-      <p:sp>
-        <p:nvSpPr>
-          <p:cNvPr id="50" name="직사각형 49"/>
-          <p:cNvSpPr/>
-          <p:nvPr/>
-        </p:nvSpPr>
-        <p:spPr>
-          <a:xfrm>
-            <a:off x="2746925" y="3245672"/>
-            <a:ext cx="685801" cy="274320"/>
-          </a:xfrm>
-          <a:prstGeom prst="rect">
-            <a:avLst/>
-          </a:prstGeom>
-          <a:noFill/>
-          <a:ln>
-            <a:noFill/>
-          </a:ln>
-        </p:spPr>
-        <p:style>
-          <a:lnRef idx="2">
-            <a:schemeClr val="accent1">
-              <a:shade val="50000"/>
-            </a:schemeClr>
-          </a:lnRef>
-          <a:fillRef idx="1">
-            <a:schemeClr val="accent1"/>
-          </a:fillRef>
-          <a:effectRef idx="0">
-            <a:schemeClr val="accent1"/>
-          </a:effectRef>
-          <a:fontRef idx="minor">
-            <a:schemeClr val="lt1"/>
-          </a:fontRef>
-        </p:style>
-        <p:txBody>
-          <a:bodyPr rtlCol="0" anchor="ctr"/>
-          <a:lstStyle/>
-          <a:p>
-            <a:pPr algn="ctr"/>
-            <a:r>
-              <a:rPr lang="en-US" altLang="ko-KR" sz="2800" dirty="0" smtClean="0">
-                <a:solidFill>
-                  <a:schemeClr val="tx1"/>
-                </a:solidFill>
-              </a:rPr>
-              <a:t>h</a:t>
-            </a:r>
-            <a:r>
-              <a:rPr lang="en-US" altLang="ko-KR" sz="2800" baseline="-25000" dirty="0" smtClean="0">
-                <a:solidFill>
-                  <a:schemeClr val="tx1"/>
-                </a:solidFill>
-              </a:rPr>
-              <a:t>o</a:t>
-            </a:r>
-            <a:endParaRPr lang="ko-KR" altLang="en-US" sz="2800" baseline="-25000" dirty="0">
-              <a:solidFill>
-                <a:schemeClr val="tx1"/>
-              </a:solidFill>
-            </a:endParaRPr>
-          </a:p>
-        </p:txBody>
-      </p:sp>
-      <p:cxnSp>
-        <p:nvCxnSpPr>
-          <p:cNvPr id="51" name="직선 화살표 연결선 50"/>
-          <p:cNvCxnSpPr/>
-          <p:nvPr/>
-        </p:nvCxnSpPr>
-        <p:spPr>
-          <a:xfrm flipV="1">
-            <a:off x="3432726" y="2441568"/>
-            <a:ext cx="0" cy="1738195"/>
-          </a:xfrm>
-          <a:prstGeom prst="straightConnector1">
-            <a:avLst/>
-          </a:prstGeom>
-          <a:ln>
-            <a:solidFill>
-              <a:schemeClr val="tx1"/>
-            </a:solidFill>
-            <a:headEnd type="triangle"/>
-            <a:tailEnd type="triangle"/>
           </a:ln>
         </p:spPr>
         <p:style>
@@ -3604,24 +4977,195 @@
       </p:cxnSp>
       <p:cxnSp>
         <p:nvCxnSpPr>
-          <p:cNvPr id="23" name="직선 화살표 연결선 22"/>
+          <p:cNvPr id="32" name="직선 연결선 31"/>
           <p:cNvCxnSpPr/>
           <p:nvPr/>
         </p:nvCxnSpPr>
         <p:spPr>
-          <a:xfrm flipV="1">
-            <a:off x="1537424" y="1978430"/>
-            <a:ext cx="0" cy="2725615"/>
-          </a:xfrm>
-          <a:prstGeom prst="straightConnector1">
+          <a:xfrm>
+            <a:off x="6104859" y="2910473"/>
+            <a:ext cx="3701446" cy="0"/>
+          </a:xfrm>
+          <a:prstGeom prst="line">
+            <a:avLst/>
+          </a:prstGeom>
+          <a:ln w="63500">
+            <a:solidFill>
+              <a:schemeClr val="tx1"/>
+            </a:solidFill>
+          </a:ln>
+        </p:spPr>
+        <p:style>
+          <a:lnRef idx="1">
+            <a:schemeClr val="accent1"/>
+          </a:lnRef>
+          <a:fillRef idx="0">
+            <a:schemeClr val="accent1"/>
+          </a:fillRef>
+          <a:effectRef idx="0">
+            <a:schemeClr val="accent1"/>
+          </a:effectRef>
+          <a:fontRef idx="minor">
+            <a:schemeClr val="tx1"/>
+          </a:fontRef>
+        </p:style>
+      </p:cxnSp>
+      <p:sp>
+        <p:nvSpPr>
+          <p:cNvPr id="33" name="육각형 32"/>
+          <p:cNvSpPr/>
+          <p:nvPr/>
+        </p:nvSpPr>
+        <p:spPr>
+          <a:xfrm>
+            <a:off x="6385501" y="1514529"/>
+            <a:ext cx="1135743" cy="1089228"/>
+          </a:xfrm>
+          <a:prstGeom prst="hexagon">
+            <a:avLst/>
+          </a:prstGeom>
+          <a:noFill/>
+          <a:ln w="50800">
+            <a:solidFill>
+              <a:schemeClr val="tx1"/>
+            </a:solidFill>
+          </a:ln>
+        </p:spPr>
+        <p:style>
+          <a:lnRef idx="2">
+            <a:schemeClr val="accent1">
+              <a:shade val="50000"/>
+            </a:schemeClr>
+          </a:lnRef>
+          <a:fillRef idx="1">
+            <a:schemeClr val="accent1"/>
+          </a:fillRef>
+          <a:effectRef idx="0">
+            <a:schemeClr val="accent1"/>
+          </a:effectRef>
+          <a:fontRef idx="minor">
+            <a:schemeClr val="lt1"/>
+          </a:fontRef>
+        </p:style>
+        <p:txBody>
+          <a:bodyPr rtlCol="0" anchor="ctr"/>
+          <a:lstStyle/>
+          <a:p>
+            <a:pPr algn="ctr"/>
+            <a:endParaRPr lang="ko-KR" altLang="en-US"/>
+          </a:p>
+        </p:txBody>
+      </p:sp>
+      <p:sp>
+        <p:nvSpPr>
+          <p:cNvPr id="34" name="육각형 33"/>
+          <p:cNvSpPr/>
+          <p:nvPr/>
+        </p:nvSpPr>
+        <p:spPr>
+          <a:xfrm>
+            <a:off x="8195450" y="1514529"/>
+            <a:ext cx="1135743" cy="1089228"/>
+          </a:xfrm>
+          <a:prstGeom prst="hexagon">
+            <a:avLst/>
+          </a:prstGeom>
+          <a:noFill/>
+          <a:ln w="50800">
+            <a:solidFill>
+              <a:schemeClr val="tx1"/>
+            </a:solidFill>
+          </a:ln>
+        </p:spPr>
+        <p:style>
+          <a:lnRef idx="2">
+            <a:schemeClr val="accent1">
+              <a:shade val="50000"/>
+            </a:schemeClr>
+          </a:lnRef>
+          <a:fillRef idx="1">
+            <a:schemeClr val="accent1"/>
+          </a:fillRef>
+          <a:effectRef idx="0">
+            <a:schemeClr val="accent1"/>
+          </a:effectRef>
+          <a:fontRef idx="minor">
+            <a:schemeClr val="lt1"/>
+          </a:fontRef>
+        </p:style>
+        <p:txBody>
+          <a:bodyPr rtlCol="0" anchor="ctr"/>
+          <a:lstStyle/>
+          <a:p>
+            <a:pPr algn="ctr"/>
+            <a:endParaRPr lang="ko-KR" altLang="en-US"/>
+          </a:p>
+        </p:txBody>
+      </p:sp>
+      <p:sp>
+        <p:nvSpPr>
+          <p:cNvPr id="3" name="직사각형 2"/>
+          <p:cNvSpPr/>
+          <p:nvPr/>
+        </p:nvSpPr>
+        <p:spPr>
+          <a:xfrm>
+            <a:off x="6188043" y="656195"/>
+            <a:ext cx="3476625" cy="527468"/>
+          </a:xfrm>
+          <a:prstGeom prst="rect">
+            <a:avLst/>
+          </a:prstGeom>
+          <a:noFill/>
+          <a:ln>
+            <a:solidFill>
+              <a:schemeClr val="tx1"/>
+            </a:solidFill>
+          </a:ln>
+        </p:spPr>
+        <p:style>
+          <a:lnRef idx="2">
+            <a:schemeClr val="accent1">
+              <a:shade val="50000"/>
+            </a:schemeClr>
+          </a:lnRef>
+          <a:fillRef idx="1">
+            <a:schemeClr val="accent1"/>
+          </a:fillRef>
+          <a:effectRef idx="0">
+            <a:schemeClr val="accent1"/>
+          </a:effectRef>
+          <a:fontRef idx="minor">
+            <a:schemeClr val="lt1"/>
+          </a:fontRef>
+        </p:style>
+        <p:txBody>
+          <a:bodyPr rtlCol="0" anchor="ctr"/>
+          <a:lstStyle/>
+          <a:p>
+            <a:pPr algn="ctr"/>
+            <a:endParaRPr lang="ko-KR" altLang="en-US"/>
+          </a:p>
+        </p:txBody>
+      </p:sp>
+      <p:cxnSp>
+        <p:nvCxnSpPr>
+          <p:cNvPr id="6" name="직선 연결선 5"/>
+          <p:cNvCxnSpPr/>
+          <p:nvPr/>
+        </p:nvCxnSpPr>
+        <p:spPr>
+          <a:xfrm flipH="1">
+            <a:off x="6811348" y="656195"/>
+            <a:ext cx="447868" cy="527468"/>
+          </a:xfrm>
+          <a:prstGeom prst="line">
             <a:avLst/>
           </a:prstGeom>
           <a:ln>
             <a:solidFill>
               <a:schemeClr val="tx1"/>
             </a:solidFill>
-            <a:headEnd type="triangle"/>
-            <a:tailEnd type="triangle"/>
           </a:ln>
         </p:spPr>
         <p:style>
@@ -3641,14 +5185,14 @@
       </p:cxnSp>
       <p:cxnSp>
         <p:nvCxnSpPr>
-          <p:cNvPr id="25" name="직선 연결선 24"/>
+          <p:cNvPr id="54" name="직선 연결선 53"/>
           <p:cNvCxnSpPr/>
           <p:nvPr/>
         </p:nvCxnSpPr>
         <p:spPr>
-          <a:xfrm flipH="1" flipV="1">
-            <a:off x="897775" y="1950698"/>
-            <a:ext cx="1151837" cy="1"/>
+          <a:xfrm flipH="1">
+            <a:off x="6953372" y="656195"/>
+            <a:ext cx="447868" cy="527468"/>
           </a:xfrm>
           <a:prstGeom prst="line">
             <a:avLst/>
@@ -3676,14 +5220,14 @@
       </p:cxnSp>
       <p:cxnSp>
         <p:nvCxnSpPr>
-          <p:cNvPr id="26" name="직선 연결선 25"/>
+          <p:cNvPr id="55" name="직선 연결선 54"/>
           <p:cNvCxnSpPr/>
           <p:nvPr/>
         </p:nvCxnSpPr>
         <p:spPr>
-          <a:xfrm flipH="1" flipV="1">
-            <a:off x="897775" y="4704045"/>
-            <a:ext cx="1151837" cy="1"/>
+          <a:xfrm flipH="1">
+            <a:off x="8195450" y="656195"/>
+            <a:ext cx="447868" cy="527468"/>
           </a:xfrm>
           <a:prstGeom prst="line">
             <a:avLst/>
@@ -3709,23 +5253,60 @@
           </a:fontRef>
         </p:style>
       </p:cxnSp>
-      <p:sp>
-        <p:nvSpPr>
-          <p:cNvPr id="27" name="직사각형 26"/>
+      <p:cxnSp>
+        <p:nvCxnSpPr>
+          <p:cNvPr id="56" name="직선 연결선 55"/>
+          <p:cNvCxnSpPr/>
+          <p:nvPr/>
+        </p:nvCxnSpPr>
+        <p:spPr>
+          <a:xfrm flipH="1">
+            <a:off x="8315453" y="656195"/>
+            <a:ext cx="447868" cy="527468"/>
+          </a:xfrm>
+          <a:prstGeom prst="line">
+            <a:avLst/>
+          </a:prstGeom>
+          <a:ln>
+            <a:solidFill>
+              <a:schemeClr val="tx1"/>
+            </a:solidFill>
+          </a:ln>
+        </p:spPr>
+        <p:style>
+          <a:lnRef idx="1">
+            <a:schemeClr val="accent1"/>
+          </a:lnRef>
+          <a:fillRef idx="0">
+            <a:schemeClr val="accent1"/>
+          </a:fillRef>
+          <a:effectRef idx="0">
+            <a:schemeClr val="accent1"/>
+          </a:effectRef>
+          <a:fontRef idx="minor">
+            <a:schemeClr val="tx1"/>
+          </a:fontRef>
+        </p:style>
+      </p:cxnSp>
+      <p:sp>
+        <p:nvSpPr>
+          <p:cNvPr id="8" name="타원 7"/>
           <p:cNvSpPr/>
           <p:nvPr/>
         </p:nvSpPr>
         <p:spPr>
           <a:xfrm>
-            <a:off x="986359" y="3245672"/>
-            <a:ext cx="685801" cy="274320"/>
-          </a:xfrm>
-          <a:prstGeom prst="rect">
+            <a:off x="7080925" y="941583"/>
+            <a:ext cx="166202" cy="152400"/>
+          </a:xfrm>
+          <a:prstGeom prst="ellipse">
             <a:avLst/>
           </a:prstGeom>
           <a:noFill/>
           <a:ln>
-            <a:noFill/>
+            <a:solidFill>
+              <a:schemeClr val="tx1"/>
+            </a:solidFill>
           </a:ln>
         </p:spPr>
         <p:style>
@@ -3749,23 +5330,1277 @@
           <a:lstStyle/>
           <a:p>
             <a:pPr algn="ctr"/>
+            <a:endParaRPr lang="ko-KR" altLang="en-US"/>
+          </a:p>
+        </p:txBody>
+      </p:sp>
+      <p:sp>
+        <p:nvSpPr>
+          <p:cNvPr id="57" name="타원 56"/>
+          <p:cNvSpPr/>
+          <p:nvPr/>
+        </p:nvSpPr>
+        <p:spPr>
+          <a:xfrm>
+            <a:off x="6750268" y="1033560"/>
+            <a:ext cx="118812" cy="119247"/>
+          </a:xfrm>
+          <a:prstGeom prst="ellipse">
+            <a:avLst/>
+          </a:prstGeom>
+          <a:noFill/>
+          <a:ln>
+            <a:solidFill>
+              <a:schemeClr val="tx1"/>
+            </a:solidFill>
+          </a:ln>
+        </p:spPr>
+        <p:style>
+          <a:lnRef idx="2">
+            <a:schemeClr val="accent1">
+              <a:shade val="50000"/>
+            </a:schemeClr>
+          </a:lnRef>
+          <a:fillRef idx="1">
+            <a:schemeClr val="accent1"/>
+          </a:fillRef>
+          <a:effectRef idx="0">
+            <a:schemeClr val="accent1"/>
+          </a:effectRef>
+          <a:fontRef idx="minor">
+            <a:schemeClr val="lt1"/>
+          </a:fontRef>
+        </p:style>
+        <p:txBody>
+          <a:bodyPr rtlCol="0" anchor="ctr"/>
+          <a:lstStyle/>
+          <a:p>
+            <a:pPr algn="ctr"/>
+            <a:endParaRPr lang="ko-KR" altLang="en-US"/>
+          </a:p>
+        </p:txBody>
+      </p:sp>
+      <p:sp>
+        <p:nvSpPr>
+          <p:cNvPr id="58" name="타원 57"/>
+          <p:cNvSpPr/>
+          <p:nvPr/>
+        </p:nvSpPr>
+        <p:spPr>
+          <a:xfrm>
+            <a:off x="8199284" y="767529"/>
+            <a:ext cx="166202" cy="152400"/>
+          </a:xfrm>
+          <a:prstGeom prst="ellipse">
+            <a:avLst/>
+          </a:prstGeom>
+          <a:noFill/>
+          <a:ln>
+            <a:solidFill>
+              <a:schemeClr val="tx1"/>
+            </a:solidFill>
+          </a:ln>
+        </p:spPr>
+        <p:style>
+          <a:lnRef idx="2">
+            <a:schemeClr val="accent1">
+              <a:shade val="50000"/>
+            </a:schemeClr>
+          </a:lnRef>
+          <a:fillRef idx="1">
+            <a:schemeClr val="accent1"/>
+          </a:fillRef>
+          <a:effectRef idx="0">
+            <a:schemeClr val="accent1"/>
+          </a:effectRef>
+          <a:fontRef idx="minor">
+            <a:schemeClr val="lt1"/>
+          </a:fontRef>
+        </p:style>
+        <p:txBody>
+          <a:bodyPr rtlCol="0" anchor="ctr"/>
+          <a:lstStyle/>
+          <a:p>
+            <a:pPr algn="ctr"/>
+            <a:endParaRPr lang="ko-KR" altLang="en-US"/>
+          </a:p>
+        </p:txBody>
+      </p:sp>
+      <p:sp>
+        <p:nvSpPr>
+          <p:cNvPr id="59" name="타원 58"/>
+          <p:cNvSpPr/>
+          <p:nvPr/>
+        </p:nvSpPr>
+        <p:spPr>
+          <a:xfrm>
+            <a:off x="6997918" y="767529"/>
+            <a:ext cx="118812" cy="119247"/>
+          </a:xfrm>
+          <a:prstGeom prst="ellipse">
+            <a:avLst/>
+          </a:prstGeom>
+          <a:noFill/>
+          <a:ln>
+            <a:solidFill>
+              <a:schemeClr val="tx1"/>
+            </a:solidFill>
+          </a:ln>
+        </p:spPr>
+        <p:style>
+          <a:lnRef idx="2">
+            <a:schemeClr val="accent1">
+              <a:shade val="50000"/>
+            </a:schemeClr>
+          </a:lnRef>
+          <a:fillRef idx="1">
+            <a:schemeClr val="accent1"/>
+          </a:fillRef>
+          <a:effectRef idx="0">
+            <a:schemeClr val="accent1"/>
+          </a:effectRef>
+          <a:fontRef idx="minor">
+            <a:schemeClr val="lt1"/>
+          </a:fontRef>
+        </p:style>
+        <p:txBody>
+          <a:bodyPr rtlCol="0" anchor="ctr"/>
+          <a:lstStyle/>
+          <a:p>
+            <a:pPr algn="ctr"/>
+            <a:endParaRPr lang="ko-KR" altLang="en-US"/>
+          </a:p>
+        </p:txBody>
+      </p:sp>
+      <p:sp>
+        <p:nvSpPr>
+          <p:cNvPr id="60" name="타원 59"/>
+          <p:cNvSpPr/>
+          <p:nvPr/>
+        </p:nvSpPr>
+        <p:spPr>
+          <a:xfrm>
+            <a:off x="8222979" y="992172"/>
+            <a:ext cx="118812" cy="119247"/>
+          </a:xfrm>
+          <a:prstGeom prst="ellipse">
+            <a:avLst/>
+          </a:prstGeom>
+          <a:noFill/>
+          <a:ln>
+            <a:solidFill>
+              <a:schemeClr val="tx1"/>
+            </a:solidFill>
+          </a:ln>
+        </p:spPr>
+        <p:style>
+          <a:lnRef idx="2">
+            <a:schemeClr val="accent1">
+              <a:shade val="50000"/>
+            </a:schemeClr>
+          </a:lnRef>
+          <a:fillRef idx="1">
+            <a:schemeClr val="accent1"/>
+          </a:fillRef>
+          <a:effectRef idx="0">
+            <a:schemeClr val="accent1"/>
+          </a:effectRef>
+          <a:fontRef idx="minor">
+            <a:schemeClr val="lt1"/>
+          </a:fontRef>
+        </p:style>
+        <p:txBody>
+          <a:bodyPr rtlCol="0" anchor="ctr"/>
+          <a:lstStyle/>
+          <a:p>
+            <a:pPr algn="ctr"/>
+            <a:endParaRPr lang="ko-KR" altLang="en-US"/>
+          </a:p>
+        </p:txBody>
+      </p:sp>
+      <p:sp>
+        <p:nvSpPr>
+          <p:cNvPr id="61" name="타원 60"/>
+          <p:cNvSpPr/>
+          <p:nvPr/>
+        </p:nvSpPr>
+        <p:spPr>
+          <a:xfrm>
+            <a:off x="8456286" y="843729"/>
+            <a:ext cx="166202" cy="152400"/>
+          </a:xfrm>
+          <a:prstGeom prst="ellipse">
+            <a:avLst/>
+          </a:prstGeom>
+          <a:noFill/>
+          <a:ln>
+            <a:solidFill>
+              <a:schemeClr val="tx1"/>
+            </a:solidFill>
+          </a:ln>
+        </p:spPr>
+        <p:style>
+          <a:lnRef idx="2">
+            <a:schemeClr val="accent1">
+              <a:shade val="50000"/>
+            </a:schemeClr>
+          </a:lnRef>
+          <a:fillRef idx="1">
+            <a:schemeClr val="accent1"/>
+          </a:fillRef>
+          <a:effectRef idx="0">
+            <a:schemeClr val="accent1"/>
+          </a:effectRef>
+          <a:fontRef idx="minor">
+            <a:schemeClr val="lt1"/>
+          </a:fontRef>
+        </p:style>
+        <p:txBody>
+          <a:bodyPr rtlCol="0" anchor="ctr"/>
+          <a:lstStyle/>
+          <a:p>
+            <a:pPr algn="ctr"/>
+            <a:endParaRPr lang="ko-KR" altLang="en-US"/>
+          </a:p>
+        </p:txBody>
+      </p:sp>
+      <p:sp>
+        <p:nvSpPr>
+          <p:cNvPr id="62" name="직사각형 61"/>
+          <p:cNvSpPr/>
+          <p:nvPr/>
+        </p:nvSpPr>
+        <p:spPr>
+          <a:xfrm>
+            <a:off x="1808740" y="656195"/>
+            <a:ext cx="3476625" cy="527468"/>
+          </a:xfrm>
+          <a:prstGeom prst="rect">
+            <a:avLst/>
+          </a:prstGeom>
+          <a:noFill/>
+          <a:ln>
+            <a:solidFill>
+              <a:schemeClr val="tx1"/>
+            </a:solidFill>
+            <a:prstDash val="dash"/>
+          </a:ln>
+        </p:spPr>
+        <p:style>
+          <a:lnRef idx="2">
+            <a:schemeClr val="accent1">
+              <a:shade val="50000"/>
+            </a:schemeClr>
+          </a:lnRef>
+          <a:fillRef idx="1">
+            <a:schemeClr val="accent1"/>
+          </a:fillRef>
+          <a:effectRef idx="0">
+            <a:schemeClr val="accent1"/>
+          </a:effectRef>
+          <a:fontRef idx="minor">
+            <a:schemeClr val="lt1"/>
+          </a:fontRef>
+        </p:style>
+        <p:txBody>
+          <a:bodyPr rtlCol="0" anchor="ctr"/>
+          <a:lstStyle/>
+          <a:p>
+            <a:pPr algn="ctr"/>
             <a:r>
-              <a:rPr lang="en-US" altLang="ko-KR" sz="2800" dirty="0" smtClean="0">
+              <a:rPr lang="en-US" altLang="ko-KR" dirty="0" smtClean="0">
                 <a:solidFill>
                   <a:schemeClr val="tx1"/>
                 </a:solidFill>
               </a:rPr>
-              <a:t>d</a:t>
+              <a:t>No Slab</a:t>
             </a:r>
+            <a:endParaRPr lang="ko-KR" altLang="en-US" dirty="0">
+              <a:solidFill>
+                <a:schemeClr val="tx1"/>
+              </a:solidFill>
+            </a:endParaRPr>
+          </a:p>
+        </p:txBody>
+      </p:sp>
+      <p:cxnSp>
+        <p:nvCxnSpPr>
+          <p:cNvPr id="63" name="직선 연결선 62"/>
+          <p:cNvCxnSpPr/>
+          <p:nvPr/>
+        </p:nvCxnSpPr>
+        <p:spPr>
+          <a:xfrm>
+            <a:off x="1724824" y="3951294"/>
+            <a:ext cx="3638098" cy="0"/>
+          </a:xfrm>
+          <a:prstGeom prst="line">
+            <a:avLst/>
+          </a:prstGeom>
+          <a:ln w="63500">
+            <a:solidFill>
+              <a:schemeClr val="tx1"/>
+            </a:solidFill>
+          </a:ln>
+        </p:spPr>
+        <p:style>
+          <a:lnRef idx="1">
+            <a:schemeClr val="accent1"/>
+          </a:lnRef>
+          <a:fillRef idx="0">
+            <a:schemeClr val="accent1"/>
+          </a:fillRef>
+          <a:effectRef idx="0">
+            <a:schemeClr val="accent1"/>
+          </a:effectRef>
+          <a:fontRef idx="minor">
+            <a:schemeClr val="tx1"/>
+          </a:fontRef>
+        </p:style>
+      </p:cxnSp>
+      <p:cxnSp>
+        <p:nvCxnSpPr>
+          <p:cNvPr id="64" name="직선 연결선 63"/>
+          <p:cNvCxnSpPr/>
+          <p:nvPr/>
+        </p:nvCxnSpPr>
+        <p:spPr>
+          <a:xfrm>
+            <a:off x="1724824" y="4041985"/>
+            <a:ext cx="3638098" cy="0"/>
+          </a:xfrm>
+          <a:prstGeom prst="line">
+            <a:avLst/>
+          </a:prstGeom>
+          <a:ln w="63500">
+            <a:solidFill>
+              <a:schemeClr val="tx1"/>
+            </a:solidFill>
+          </a:ln>
+        </p:spPr>
+        <p:style>
+          <a:lnRef idx="1">
+            <a:schemeClr val="accent1"/>
+          </a:lnRef>
+          <a:fillRef idx="0">
+            <a:schemeClr val="accent1"/>
+          </a:fillRef>
+          <a:effectRef idx="0">
+            <a:schemeClr val="accent1"/>
+          </a:effectRef>
+          <a:fontRef idx="minor">
+            <a:schemeClr val="tx1"/>
+          </a:fontRef>
+        </p:style>
+      </p:cxnSp>
+      <p:cxnSp>
+        <p:nvCxnSpPr>
+          <p:cNvPr id="65" name="직선 연결선 64"/>
+          <p:cNvCxnSpPr/>
+          <p:nvPr/>
+        </p:nvCxnSpPr>
+        <p:spPr>
+          <a:xfrm>
+            <a:off x="1724824" y="5545848"/>
+            <a:ext cx="3701446" cy="0"/>
+          </a:xfrm>
+          <a:prstGeom prst="line">
+            <a:avLst/>
+          </a:prstGeom>
+          <a:ln w="63500">
+            <a:solidFill>
+              <a:schemeClr val="tx1"/>
+            </a:solidFill>
+          </a:ln>
+        </p:spPr>
+        <p:style>
+          <a:lnRef idx="1">
+            <a:schemeClr val="accent1"/>
+          </a:lnRef>
+          <a:fillRef idx="0">
+            <a:schemeClr val="accent1"/>
+          </a:fillRef>
+          <a:effectRef idx="0">
+            <a:schemeClr val="accent1"/>
+          </a:effectRef>
+          <a:fontRef idx="minor">
+            <a:schemeClr val="tx1"/>
+          </a:fontRef>
+        </p:style>
+      </p:cxnSp>
+      <p:cxnSp>
+        <p:nvCxnSpPr>
+          <p:cNvPr id="66" name="직선 연결선 65"/>
+          <p:cNvCxnSpPr/>
+          <p:nvPr/>
+        </p:nvCxnSpPr>
+        <p:spPr>
+          <a:xfrm>
+            <a:off x="1724824" y="5636539"/>
+            <a:ext cx="3701446" cy="0"/>
+          </a:xfrm>
+          <a:prstGeom prst="line">
+            <a:avLst/>
+          </a:prstGeom>
+          <a:ln w="63500">
+            <a:solidFill>
+              <a:schemeClr val="tx1"/>
+            </a:solidFill>
+          </a:ln>
+        </p:spPr>
+        <p:style>
+          <a:lnRef idx="1">
+            <a:schemeClr val="accent1"/>
+          </a:lnRef>
+          <a:fillRef idx="0">
+            <a:schemeClr val="accent1"/>
+          </a:fillRef>
+          <a:effectRef idx="0">
+            <a:schemeClr val="accent1"/>
+          </a:effectRef>
+          <a:fontRef idx="minor">
+            <a:schemeClr val="tx1"/>
+          </a:fontRef>
+        </p:style>
+      </p:cxnSp>
+      <p:sp>
+        <p:nvSpPr>
+          <p:cNvPr id="67" name="육각형 66"/>
+          <p:cNvSpPr/>
+          <p:nvPr/>
+        </p:nvSpPr>
+        <p:spPr>
+          <a:xfrm>
+            <a:off x="2005466" y="4240595"/>
+            <a:ext cx="1135743" cy="1089228"/>
+          </a:xfrm>
+          <a:prstGeom prst="hexagon">
+            <a:avLst/>
+          </a:prstGeom>
+          <a:noFill/>
+          <a:ln w="50800">
+            <a:solidFill>
+              <a:schemeClr val="tx1"/>
+            </a:solidFill>
+          </a:ln>
+        </p:spPr>
+        <p:style>
+          <a:lnRef idx="2">
+            <a:schemeClr val="accent1">
+              <a:shade val="50000"/>
+            </a:schemeClr>
+          </a:lnRef>
+          <a:fillRef idx="1">
+            <a:schemeClr val="accent1"/>
+          </a:fillRef>
+          <a:effectRef idx="0">
+            <a:schemeClr val="accent1"/>
+          </a:effectRef>
+          <a:fontRef idx="minor">
+            <a:schemeClr val="lt1"/>
+          </a:fontRef>
+        </p:style>
+        <p:txBody>
+          <a:bodyPr rtlCol="0" anchor="ctr"/>
+          <a:lstStyle/>
+          <a:p>
+            <a:pPr algn="ctr"/>
+            <a:endParaRPr lang="ko-KR" altLang="en-US"/>
+          </a:p>
+        </p:txBody>
+      </p:sp>
+      <p:sp>
+        <p:nvSpPr>
+          <p:cNvPr id="68" name="육각형 67"/>
+          <p:cNvSpPr/>
+          <p:nvPr/>
+        </p:nvSpPr>
+        <p:spPr>
+          <a:xfrm>
+            <a:off x="3815415" y="4240595"/>
+            <a:ext cx="1135743" cy="1089228"/>
+          </a:xfrm>
+          <a:prstGeom prst="hexagon">
+            <a:avLst/>
+          </a:prstGeom>
+          <a:noFill/>
+          <a:ln w="50800">
+            <a:solidFill>
+              <a:schemeClr val="tx1"/>
+            </a:solidFill>
+          </a:ln>
+        </p:spPr>
+        <p:style>
+          <a:lnRef idx="2">
+            <a:schemeClr val="accent1">
+              <a:shade val="50000"/>
+            </a:schemeClr>
+          </a:lnRef>
+          <a:fillRef idx="1">
+            <a:schemeClr val="accent1"/>
+          </a:fillRef>
+          <a:effectRef idx="0">
+            <a:schemeClr val="accent1"/>
+          </a:effectRef>
+          <a:fontRef idx="minor">
+            <a:schemeClr val="lt1"/>
+          </a:fontRef>
+        </p:style>
+        <p:txBody>
+          <a:bodyPr rtlCol="0" anchor="ctr"/>
+          <a:lstStyle/>
+          <a:p>
+            <a:pPr algn="ctr"/>
+            <a:endParaRPr lang="ko-KR" altLang="en-US"/>
+          </a:p>
+        </p:txBody>
+      </p:sp>
+      <p:cxnSp>
+        <p:nvCxnSpPr>
+          <p:cNvPr id="69" name="직선 연결선 68"/>
+          <p:cNvCxnSpPr/>
+          <p:nvPr/>
+        </p:nvCxnSpPr>
+        <p:spPr>
+          <a:xfrm>
+            <a:off x="6104859" y="3949767"/>
+            <a:ext cx="3638098" cy="0"/>
+          </a:xfrm>
+          <a:prstGeom prst="line">
+            <a:avLst/>
+          </a:prstGeom>
+          <a:ln w="63500">
+            <a:solidFill>
+              <a:schemeClr val="tx1"/>
+            </a:solidFill>
+          </a:ln>
+        </p:spPr>
+        <p:style>
+          <a:lnRef idx="1">
+            <a:schemeClr val="accent1"/>
+          </a:lnRef>
+          <a:fillRef idx="0">
+            <a:schemeClr val="accent1"/>
+          </a:fillRef>
+          <a:effectRef idx="0">
+            <a:schemeClr val="accent1"/>
+          </a:effectRef>
+          <a:fontRef idx="minor">
+            <a:schemeClr val="tx1"/>
+          </a:fontRef>
+        </p:style>
+      </p:cxnSp>
+      <p:cxnSp>
+        <p:nvCxnSpPr>
+          <p:cNvPr id="70" name="직선 연결선 69"/>
+          <p:cNvCxnSpPr/>
+          <p:nvPr/>
+        </p:nvCxnSpPr>
+        <p:spPr>
+          <a:xfrm>
+            <a:off x="6104859" y="4040458"/>
+            <a:ext cx="3638098" cy="0"/>
+          </a:xfrm>
+          <a:prstGeom prst="line">
+            <a:avLst/>
+          </a:prstGeom>
+          <a:ln w="63500">
+            <a:solidFill>
+              <a:schemeClr val="tx1"/>
+            </a:solidFill>
+          </a:ln>
+        </p:spPr>
+        <p:style>
+          <a:lnRef idx="1">
+            <a:schemeClr val="accent1"/>
+          </a:lnRef>
+          <a:fillRef idx="0">
+            <a:schemeClr val="accent1"/>
+          </a:fillRef>
+          <a:effectRef idx="0">
+            <a:schemeClr val="accent1"/>
+          </a:effectRef>
+          <a:fontRef idx="minor">
+            <a:schemeClr val="tx1"/>
+          </a:fontRef>
+        </p:style>
+      </p:cxnSp>
+      <p:cxnSp>
+        <p:nvCxnSpPr>
+          <p:cNvPr id="71" name="직선 연결선 70"/>
+          <p:cNvCxnSpPr/>
+          <p:nvPr/>
+        </p:nvCxnSpPr>
+        <p:spPr>
+          <a:xfrm>
+            <a:off x="6104859" y="5544321"/>
+            <a:ext cx="3701446" cy="0"/>
+          </a:xfrm>
+          <a:prstGeom prst="line">
+            <a:avLst/>
+          </a:prstGeom>
+          <a:ln w="63500">
+            <a:solidFill>
+              <a:schemeClr val="tx1"/>
+            </a:solidFill>
+          </a:ln>
+        </p:spPr>
+        <p:style>
+          <a:lnRef idx="1">
+            <a:schemeClr val="accent1"/>
+          </a:lnRef>
+          <a:fillRef idx="0">
+            <a:schemeClr val="accent1"/>
+          </a:fillRef>
+          <a:effectRef idx="0">
+            <a:schemeClr val="accent1"/>
+          </a:effectRef>
+          <a:fontRef idx="minor">
+            <a:schemeClr val="tx1"/>
+          </a:fontRef>
+        </p:style>
+      </p:cxnSp>
+      <p:cxnSp>
+        <p:nvCxnSpPr>
+          <p:cNvPr id="72" name="직선 연결선 71"/>
+          <p:cNvCxnSpPr/>
+          <p:nvPr/>
+        </p:nvCxnSpPr>
+        <p:spPr>
+          <a:xfrm>
+            <a:off x="6104859" y="5635012"/>
+            <a:ext cx="3701446" cy="0"/>
+          </a:xfrm>
+          <a:prstGeom prst="line">
+            <a:avLst/>
+          </a:prstGeom>
+          <a:ln w="63500">
+            <a:solidFill>
+              <a:schemeClr val="tx1"/>
+            </a:solidFill>
+          </a:ln>
+        </p:spPr>
+        <p:style>
+          <a:lnRef idx="1">
+            <a:schemeClr val="accent1"/>
+          </a:lnRef>
+          <a:fillRef idx="0">
+            <a:schemeClr val="accent1"/>
+          </a:fillRef>
+          <a:effectRef idx="0">
+            <a:schemeClr val="accent1"/>
+          </a:effectRef>
+          <a:fontRef idx="minor">
+            <a:schemeClr val="tx1"/>
+          </a:fontRef>
+        </p:style>
+      </p:cxnSp>
+      <p:sp>
+        <p:nvSpPr>
+          <p:cNvPr id="73" name="육각형 72"/>
+          <p:cNvSpPr/>
+          <p:nvPr/>
+        </p:nvSpPr>
+        <p:spPr>
+          <a:xfrm>
+            <a:off x="6385501" y="4239068"/>
+            <a:ext cx="1135743" cy="1089228"/>
+          </a:xfrm>
+          <a:prstGeom prst="hexagon">
+            <a:avLst/>
+          </a:prstGeom>
+          <a:noFill/>
+          <a:ln w="50800">
+            <a:solidFill>
+              <a:schemeClr val="tx1"/>
+            </a:solidFill>
+          </a:ln>
+        </p:spPr>
+        <p:style>
+          <a:lnRef idx="2">
+            <a:schemeClr val="accent1">
+              <a:shade val="50000"/>
+            </a:schemeClr>
+          </a:lnRef>
+          <a:fillRef idx="1">
+            <a:schemeClr val="accent1"/>
+          </a:fillRef>
+          <a:effectRef idx="0">
+            <a:schemeClr val="accent1"/>
+          </a:effectRef>
+          <a:fontRef idx="minor">
+            <a:schemeClr val="lt1"/>
+          </a:fontRef>
+        </p:style>
+        <p:txBody>
+          <a:bodyPr rtlCol="0" anchor="ctr"/>
+          <a:lstStyle/>
+          <a:p>
+            <a:pPr algn="ctr"/>
+            <a:endParaRPr lang="ko-KR" altLang="en-US"/>
+          </a:p>
+        </p:txBody>
+      </p:sp>
+      <p:sp>
+        <p:nvSpPr>
+          <p:cNvPr id="74" name="육각형 73"/>
+          <p:cNvSpPr/>
+          <p:nvPr/>
+        </p:nvSpPr>
+        <p:spPr>
+          <a:xfrm>
+            <a:off x="8195450" y="4239068"/>
+            <a:ext cx="1135743" cy="1089228"/>
+          </a:xfrm>
+          <a:prstGeom prst="hexagon">
+            <a:avLst/>
+          </a:prstGeom>
+          <a:noFill/>
+          <a:ln w="50800">
+            <a:solidFill>
+              <a:schemeClr val="tx1"/>
+            </a:solidFill>
+          </a:ln>
+        </p:spPr>
+        <p:style>
+          <a:lnRef idx="2">
+            <a:schemeClr val="accent1">
+              <a:shade val="50000"/>
+            </a:schemeClr>
+          </a:lnRef>
+          <a:fillRef idx="1">
+            <a:schemeClr val="accent1"/>
+          </a:fillRef>
+          <a:effectRef idx="0">
+            <a:schemeClr val="accent1"/>
+          </a:effectRef>
+          <a:fontRef idx="minor">
+            <a:schemeClr val="lt1"/>
+          </a:fontRef>
+        </p:style>
+        <p:txBody>
+          <a:bodyPr rtlCol="0" anchor="ctr"/>
+          <a:lstStyle/>
+          <a:p>
+            <a:pPr algn="ctr"/>
+            <a:endParaRPr lang="ko-KR" altLang="en-US"/>
+          </a:p>
+        </p:txBody>
+      </p:sp>
+      <p:sp>
+        <p:nvSpPr>
+          <p:cNvPr id="75" name="직사각형 74"/>
+          <p:cNvSpPr/>
+          <p:nvPr/>
+        </p:nvSpPr>
+        <p:spPr>
+          <a:xfrm>
+            <a:off x="6188043" y="3380734"/>
+            <a:ext cx="3476625" cy="527468"/>
+          </a:xfrm>
+          <a:prstGeom prst="rect">
+            <a:avLst/>
+          </a:prstGeom>
+          <a:noFill/>
+          <a:ln>
+            <a:solidFill>
+              <a:schemeClr val="tx1"/>
+            </a:solidFill>
+          </a:ln>
+        </p:spPr>
+        <p:style>
+          <a:lnRef idx="2">
+            <a:schemeClr val="accent1">
+              <a:shade val="50000"/>
+            </a:schemeClr>
+          </a:lnRef>
+          <a:fillRef idx="1">
+            <a:schemeClr val="accent1"/>
+          </a:fillRef>
+          <a:effectRef idx="0">
+            <a:schemeClr val="accent1"/>
+          </a:effectRef>
+          <a:fontRef idx="minor">
+            <a:schemeClr val="lt1"/>
+          </a:fontRef>
+        </p:style>
+        <p:txBody>
+          <a:bodyPr rtlCol="0" anchor="ctr"/>
+          <a:lstStyle/>
+          <a:p>
+            <a:pPr algn="ctr"/>
+            <a:endParaRPr lang="ko-KR" altLang="en-US"/>
+          </a:p>
+        </p:txBody>
+      </p:sp>
+      <p:cxnSp>
+        <p:nvCxnSpPr>
+          <p:cNvPr id="76" name="직선 연결선 75"/>
+          <p:cNvCxnSpPr/>
+          <p:nvPr/>
+        </p:nvCxnSpPr>
+        <p:spPr>
+          <a:xfrm flipH="1">
+            <a:off x="6811348" y="3380734"/>
+            <a:ext cx="447868" cy="527468"/>
+          </a:xfrm>
+          <a:prstGeom prst="line">
+            <a:avLst/>
+          </a:prstGeom>
+          <a:ln>
+            <a:solidFill>
+              <a:schemeClr val="tx1"/>
+            </a:solidFill>
+          </a:ln>
+        </p:spPr>
+        <p:style>
+          <a:lnRef idx="1">
+            <a:schemeClr val="accent1"/>
+          </a:lnRef>
+          <a:fillRef idx="0">
+            <a:schemeClr val="accent1"/>
+          </a:fillRef>
+          <a:effectRef idx="0">
+            <a:schemeClr val="accent1"/>
+          </a:effectRef>
+          <a:fontRef idx="minor">
+            <a:schemeClr val="tx1"/>
+          </a:fontRef>
+        </p:style>
+      </p:cxnSp>
+      <p:cxnSp>
+        <p:nvCxnSpPr>
+          <p:cNvPr id="77" name="직선 연결선 76"/>
+          <p:cNvCxnSpPr/>
+          <p:nvPr/>
+        </p:nvCxnSpPr>
+        <p:spPr>
+          <a:xfrm flipH="1">
+            <a:off x="6953372" y="3380734"/>
+            <a:ext cx="447868" cy="527468"/>
+          </a:xfrm>
+          <a:prstGeom prst="line">
+            <a:avLst/>
+          </a:prstGeom>
+          <a:ln>
+            <a:solidFill>
+              <a:schemeClr val="tx1"/>
+            </a:solidFill>
+          </a:ln>
+        </p:spPr>
+        <p:style>
+          <a:lnRef idx="1">
+            <a:schemeClr val="accent1"/>
+          </a:lnRef>
+          <a:fillRef idx="0">
+            <a:schemeClr val="accent1"/>
+          </a:fillRef>
+          <a:effectRef idx="0">
+            <a:schemeClr val="accent1"/>
+          </a:effectRef>
+          <a:fontRef idx="minor">
+            <a:schemeClr val="tx1"/>
+          </a:fontRef>
+        </p:style>
+      </p:cxnSp>
+      <p:cxnSp>
+        <p:nvCxnSpPr>
+          <p:cNvPr id="78" name="직선 연결선 77"/>
+          <p:cNvCxnSpPr/>
+          <p:nvPr/>
+        </p:nvCxnSpPr>
+        <p:spPr>
+          <a:xfrm flipH="1">
+            <a:off x="8195450" y="3380734"/>
+            <a:ext cx="447868" cy="527468"/>
+          </a:xfrm>
+          <a:prstGeom prst="line">
+            <a:avLst/>
+          </a:prstGeom>
+          <a:ln>
+            <a:solidFill>
+              <a:schemeClr val="tx1"/>
+            </a:solidFill>
+          </a:ln>
+        </p:spPr>
+        <p:style>
+          <a:lnRef idx="1">
+            <a:schemeClr val="accent1"/>
+          </a:lnRef>
+          <a:fillRef idx="0">
+            <a:schemeClr val="accent1"/>
+          </a:fillRef>
+          <a:effectRef idx="0">
+            <a:schemeClr val="accent1"/>
+          </a:effectRef>
+          <a:fontRef idx="minor">
+            <a:schemeClr val="tx1"/>
+          </a:fontRef>
+        </p:style>
+      </p:cxnSp>
+      <p:cxnSp>
+        <p:nvCxnSpPr>
+          <p:cNvPr id="79" name="직선 연결선 78"/>
+          <p:cNvCxnSpPr/>
+          <p:nvPr/>
+        </p:nvCxnSpPr>
+        <p:spPr>
+          <a:xfrm flipH="1">
+            <a:off x="8315453" y="3380734"/>
+            <a:ext cx="447868" cy="527468"/>
+          </a:xfrm>
+          <a:prstGeom prst="line">
+            <a:avLst/>
+          </a:prstGeom>
+          <a:ln>
+            <a:solidFill>
+              <a:schemeClr val="tx1"/>
+            </a:solidFill>
+          </a:ln>
+        </p:spPr>
+        <p:style>
+          <a:lnRef idx="1">
+            <a:schemeClr val="accent1"/>
+          </a:lnRef>
+          <a:fillRef idx="0">
+            <a:schemeClr val="accent1"/>
+          </a:fillRef>
+          <a:effectRef idx="0">
+            <a:schemeClr val="accent1"/>
+          </a:effectRef>
+          <a:fontRef idx="minor">
+            <a:schemeClr val="tx1"/>
+          </a:fontRef>
+        </p:style>
+      </p:cxnSp>
+      <p:sp>
+        <p:nvSpPr>
+          <p:cNvPr id="80" name="타원 79"/>
+          <p:cNvSpPr/>
+          <p:nvPr/>
+        </p:nvSpPr>
+        <p:spPr>
+          <a:xfrm>
+            <a:off x="7080925" y="3666122"/>
+            <a:ext cx="166202" cy="152400"/>
+          </a:xfrm>
+          <a:prstGeom prst="ellipse">
+            <a:avLst/>
+          </a:prstGeom>
+          <a:noFill/>
+          <a:ln>
+            <a:solidFill>
+              <a:schemeClr val="tx1"/>
+            </a:solidFill>
+          </a:ln>
+        </p:spPr>
+        <p:style>
+          <a:lnRef idx="2">
+            <a:schemeClr val="accent1">
+              <a:shade val="50000"/>
+            </a:schemeClr>
+          </a:lnRef>
+          <a:fillRef idx="1">
+            <a:schemeClr val="accent1"/>
+          </a:fillRef>
+          <a:effectRef idx="0">
+            <a:schemeClr val="accent1"/>
+          </a:effectRef>
+          <a:fontRef idx="minor">
+            <a:schemeClr val="lt1"/>
+          </a:fontRef>
+        </p:style>
+        <p:txBody>
+          <a:bodyPr rtlCol="0" anchor="ctr"/>
+          <a:lstStyle/>
+          <a:p>
+            <a:pPr algn="ctr"/>
+            <a:endParaRPr lang="ko-KR" altLang="en-US"/>
+          </a:p>
+        </p:txBody>
+      </p:sp>
+      <p:sp>
+        <p:nvSpPr>
+          <p:cNvPr id="81" name="타원 80"/>
+          <p:cNvSpPr/>
+          <p:nvPr/>
+        </p:nvSpPr>
+        <p:spPr>
+          <a:xfrm>
+            <a:off x="6750268" y="3758099"/>
+            <a:ext cx="118812" cy="119247"/>
+          </a:xfrm>
+          <a:prstGeom prst="ellipse">
+            <a:avLst/>
+          </a:prstGeom>
+          <a:noFill/>
+          <a:ln>
+            <a:solidFill>
+              <a:schemeClr val="tx1"/>
+            </a:solidFill>
+          </a:ln>
+        </p:spPr>
+        <p:style>
+          <a:lnRef idx="2">
+            <a:schemeClr val="accent1">
+              <a:shade val="50000"/>
+            </a:schemeClr>
+          </a:lnRef>
+          <a:fillRef idx="1">
+            <a:schemeClr val="accent1"/>
+          </a:fillRef>
+          <a:effectRef idx="0">
+            <a:schemeClr val="accent1"/>
+          </a:effectRef>
+          <a:fontRef idx="minor">
+            <a:schemeClr val="lt1"/>
+          </a:fontRef>
+        </p:style>
+        <p:txBody>
+          <a:bodyPr rtlCol="0" anchor="ctr"/>
+          <a:lstStyle/>
+          <a:p>
+            <a:pPr algn="ctr"/>
+            <a:endParaRPr lang="ko-KR" altLang="en-US"/>
+          </a:p>
+        </p:txBody>
+      </p:sp>
+      <p:sp>
+        <p:nvSpPr>
+          <p:cNvPr id="82" name="타원 81"/>
+          <p:cNvSpPr/>
+          <p:nvPr/>
+        </p:nvSpPr>
+        <p:spPr>
+          <a:xfrm>
+            <a:off x="8199284" y="3492068"/>
+            <a:ext cx="166202" cy="152400"/>
+          </a:xfrm>
+          <a:prstGeom prst="ellipse">
+            <a:avLst/>
+          </a:prstGeom>
+          <a:noFill/>
+          <a:ln>
+            <a:solidFill>
+              <a:schemeClr val="tx1"/>
+            </a:solidFill>
+          </a:ln>
+        </p:spPr>
+        <p:style>
+          <a:lnRef idx="2">
+            <a:schemeClr val="accent1">
+              <a:shade val="50000"/>
+            </a:schemeClr>
+          </a:lnRef>
+          <a:fillRef idx="1">
+            <a:schemeClr val="accent1"/>
+          </a:fillRef>
+          <a:effectRef idx="0">
+            <a:schemeClr val="accent1"/>
+          </a:effectRef>
+          <a:fontRef idx="minor">
+            <a:schemeClr val="lt1"/>
+          </a:fontRef>
+        </p:style>
+        <p:txBody>
+          <a:bodyPr rtlCol="0" anchor="ctr"/>
+          <a:lstStyle/>
+          <a:p>
+            <a:pPr algn="ctr"/>
+            <a:endParaRPr lang="ko-KR" altLang="en-US"/>
+          </a:p>
+        </p:txBody>
+      </p:sp>
+      <p:sp>
+        <p:nvSpPr>
+          <p:cNvPr id="83" name="타원 82"/>
+          <p:cNvSpPr/>
+          <p:nvPr/>
+        </p:nvSpPr>
+        <p:spPr>
+          <a:xfrm>
+            <a:off x="6997918" y="3492068"/>
+            <a:ext cx="118812" cy="119247"/>
+          </a:xfrm>
+          <a:prstGeom prst="ellipse">
+            <a:avLst/>
+          </a:prstGeom>
+          <a:noFill/>
+          <a:ln>
+            <a:solidFill>
+              <a:schemeClr val="tx1"/>
+            </a:solidFill>
+          </a:ln>
+        </p:spPr>
+        <p:style>
+          <a:lnRef idx="2">
+            <a:schemeClr val="accent1">
+              <a:shade val="50000"/>
+            </a:schemeClr>
+          </a:lnRef>
+          <a:fillRef idx="1">
+            <a:schemeClr val="accent1"/>
+          </a:fillRef>
+          <a:effectRef idx="0">
+            <a:schemeClr val="accent1"/>
+          </a:effectRef>
+          <a:fontRef idx="minor">
+            <a:schemeClr val="lt1"/>
+          </a:fontRef>
+        </p:style>
+        <p:txBody>
+          <a:bodyPr rtlCol="0" anchor="ctr"/>
+          <a:lstStyle/>
+          <a:p>
+            <a:pPr algn="ctr"/>
+            <a:endParaRPr lang="ko-KR" altLang="en-US"/>
+          </a:p>
+        </p:txBody>
+      </p:sp>
+      <p:sp>
+        <p:nvSpPr>
+          <p:cNvPr id="84" name="타원 83"/>
+          <p:cNvSpPr/>
+          <p:nvPr/>
+        </p:nvSpPr>
+        <p:spPr>
+          <a:xfrm>
+            <a:off x="8222979" y="3716711"/>
+            <a:ext cx="118812" cy="119247"/>
+          </a:xfrm>
+          <a:prstGeom prst="ellipse">
+            <a:avLst/>
+          </a:prstGeom>
+          <a:noFill/>
+          <a:ln>
+            <a:solidFill>
+              <a:schemeClr val="tx1"/>
+            </a:solidFill>
+          </a:ln>
+        </p:spPr>
+        <p:style>
+          <a:lnRef idx="2">
+            <a:schemeClr val="accent1">
+              <a:shade val="50000"/>
+            </a:schemeClr>
+          </a:lnRef>
+          <a:fillRef idx="1">
+            <a:schemeClr val="accent1"/>
+          </a:fillRef>
+          <a:effectRef idx="0">
+            <a:schemeClr val="accent1"/>
+          </a:effectRef>
+          <a:fontRef idx="minor">
+            <a:schemeClr val="lt1"/>
+          </a:fontRef>
+        </p:style>
+        <p:txBody>
+          <a:bodyPr rtlCol="0" anchor="ctr"/>
+          <a:lstStyle/>
+          <a:p>
+            <a:pPr algn="ctr"/>
+            <a:endParaRPr lang="ko-KR" altLang="en-US"/>
+          </a:p>
+        </p:txBody>
+      </p:sp>
+      <p:sp>
+        <p:nvSpPr>
+          <p:cNvPr id="85" name="타원 84"/>
+          <p:cNvSpPr/>
+          <p:nvPr/>
+        </p:nvSpPr>
+        <p:spPr>
+          <a:xfrm>
+            <a:off x="8456286" y="3568268"/>
+            <a:ext cx="166202" cy="152400"/>
+          </a:xfrm>
+          <a:prstGeom prst="ellipse">
+            <a:avLst/>
+          </a:prstGeom>
+          <a:noFill/>
+          <a:ln>
+            <a:solidFill>
+              <a:schemeClr val="tx1"/>
+            </a:solidFill>
+          </a:ln>
+        </p:spPr>
+        <p:style>
+          <a:lnRef idx="2">
+            <a:schemeClr val="accent1">
+              <a:shade val="50000"/>
+            </a:schemeClr>
+          </a:lnRef>
+          <a:fillRef idx="1">
+            <a:schemeClr val="accent1"/>
+          </a:fillRef>
+          <a:effectRef idx="0">
+            <a:schemeClr val="accent1"/>
+          </a:effectRef>
+          <a:fontRef idx="minor">
+            <a:schemeClr val="lt1"/>
+          </a:fontRef>
+        </p:style>
+        <p:txBody>
+          <a:bodyPr rtlCol="0" anchor="ctr"/>
+          <a:lstStyle/>
+          <a:p>
+            <a:pPr algn="ctr"/>
+            <a:endParaRPr lang="ko-KR" altLang="en-US"/>
+          </a:p>
+        </p:txBody>
+      </p:sp>
+      <p:sp>
+        <p:nvSpPr>
+          <p:cNvPr id="86" name="직사각형 85"/>
+          <p:cNvSpPr/>
+          <p:nvPr/>
+        </p:nvSpPr>
+        <p:spPr>
+          <a:xfrm>
+            <a:off x="1808740" y="3380734"/>
+            <a:ext cx="3476625" cy="527468"/>
+          </a:xfrm>
+          <a:prstGeom prst="rect">
+            <a:avLst/>
+          </a:prstGeom>
+          <a:noFill/>
+          <a:ln>
+            <a:solidFill>
+              <a:schemeClr val="tx1"/>
+            </a:solidFill>
+            <a:prstDash val="dash"/>
+          </a:ln>
+        </p:spPr>
+        <p:style>
+          <a:lnRef idx="2">
+            <a:schemeClr val="accent1">
+              <a:shade val="50000"/>
+            </a:schemeClr>
+          </a:lnRef>
+          <a:fillRef idx="1">
+            <a:schemeClr val="accent1"/>
+          </a:fillRef>
+          <a:effectRef idx="0">
+            <a:schemeClr val="accent1"/>
+          </a:effectRef>
+          <a:fontRef idx="minor">
+            <a:schemeClr val="lt1"/>
+          </a:fontRef>
+        </p:style>
+        <p:txBody>
+          <a:bodyPr rtlCol="0" anchor="ctr"/>
+          <a:lstStyle/>
+          <a:p>
+            <a:pPr algn="ctr"/>
             <a:r>
-              <a:rPr lang="en-US" altLang="ko-KR" sz="2800" baseline="-25000" dirty="0" smtClean="0">
+              <a:rPr lang="en-US" altLang="ko-KR" dirty="0" smtClean="0">
                 <a:solidFill>
                   <a:schemeClr val="tx1"/>
                 </a:solidFill>
               </a:rPr>
-              <a:t>c</a:t>
+              <a:t>No Slab</a:t>
             </a:r>
-            <a:endParaRPr lang="ko-KR" altLang="en-US" sz="2800" baseline="-25000" dirty="0">
+            <a:endParaRPr lang="ko-KR" altLang="en-US" dirty="0">
               <a:solidFill>
                 <a:schemeClr val="tx1"/>
               </a:solidFill>
@@ -3773,10 +6608,100 @@
           </a:p>
         </p:txBody>
       </p:sp>
+      <p:sp>
+        <p:nvSpPr>
+          <p:cNvPr id="9" name="직사각형 8"/>
+          <p:cNvSpPr/>
+          <p:nvPr/>
+        </p:nvSpPr>
+        <p:spPr>
+          <a:xfrm>
+            <a:off x="1724824" y="4562669"/>
+            <a:ext cx="3388352" cy="354564"/>
+          </a:xfrm>
+          <a:prstGeom prst="rect">
+            <a:avLst/>
+          </a:prstGeom>
+          <a:solidFill>
+            <a:schemeClr val="accent1">
+              <a:alpha val="70000"/>
+            </a:schemeClr>
+          </a:solidFill>
+        </p:spPr>
+        <p:style>
+          <a:lnRef idx="2">
+            <a:schemeClr val="accent1">
+              <a:shade val="50000"/>
+            </a:schemeClr>
+          </a:lnRef>
+          <a:fillRef idx="1">
+            <a:schemeClr val="accent1"/>
+          </a:fillRef>
+          <a:effectRef idx="0">
+            <a:schemeClr val="accent1"/>
+          </a:effectRef>
+          <a:fontRef idx="minor">
+            <a:schemeClr val="lt1"/>
+          </a:fontRef>
+        </p:style>
+        <p:txBody>
+          <a:bodyPr rtlCol="0" anchor="ctr"/>
+          <a:lstStyle/>
+          <a:p>
+            <a:pPr algn="ctr"/>
+            <a:endParaRPr lang="ko-KR" altLang="en-US"/>
+          </a:p>
+        </p:txBody>
+      </p:sp>
+      <p:sp>
+        <p:nvSpPr>
+          <p:cNvPr id="87" name="직사각형 86"/>
+          <p:cNvSpPr/>
+          <p:nvPr/>
+        </p:nvSpPr>
+        <p:spPr>
+          <a:xfrm>
+            <a:off x="6229732" y="4562669"/>
+            <a:ext cx="3388352" cy="354564"/>
+          </a:xfrm>
+          <a:prstGeom prst="rect">
+            <a:avLst/>
+          </a:prstGeom>
+          <a:solidFill>
+            <a:schemeClr val="accent1">
+              <a:alpha val="70000"/>
+            </a:schemeClr>
+          </a:solidFill>
+        </p:spPr>
+        <p:style>
+          <a:lnRef idx="2">
+            <a:schemeClr val="accent1">
+              <a:shade val="50000"/>
+            </a:schemeClr>
+          </a:lnRef>
+          <a:fillRef idx="1">
+            <a:schemeClr val="accent1"/>
+          </a:fillRef>
+          <a:effectRef idx="0">
+            <a:schemeClr val="accent1"/>
+          </a:effectRef>
+          <a:fontRef idx="minor">
+            <a:schemeClr val="lt1"/>
+          </a:fontRef>
+        </p:style>
+        <p:txBody>
+          <a:bodyPr rtlCol="0" anchor="ctr"/>
+          <a:lstStyle/>
+          <a:p>
+            <a:pPr algn="ctr"/>
+            <a:endParaRPr lang="ko-KR" altLang="en-US"/>
+          </a:p>
+        </p:txBody>
+      </p:sp>
     </p:spTree>
     <p:extLst>
       <p:ext uri="{BB962C8B-B14F-4D97-AF65-F5344CB8AC3E}">
-        <p14:creationId xmlns:p14="http://schemas.microsoft.com/office/powerpoint/2010/main" val="3513591094"/>
+        <p14:creationId xmlns:p14="http://schemas.microsoft.com/office/powerpoint/2010/main" val="3612606210"/>
       </p:ext>
     </p:extLst>
   </p:cSld>

</xml_diff>